<commit_message>
Add slides with data and model
</commit_message>
<xml_diff>
--- a/SHAP in R.pptx
+++ b/SHAP in R.pptx
@@ -6,14 +6,15 @@
   </p:sldMasterIdLst>
   <p:sldIdLst>
     <p:sldId id="256" r:id="rId2"/>
-    <p:sldId id="259" r:id="rId3"/>
-    <p:sldId id="258" r:id="rId4"/>
-    <p:sldId id="260" r:id="rId5"/>
-    <p:sldId id="261" r:id="rId6"/>
-    <p:sldId id="262" r:id="rId7"/>
-    <p:sldId id="265" r:id="rId8"/>
-    <p:sldId id="263" r:id="rId9"/>
-    <p:sldId id="264" r:id="rId10"/>
+    <p:sldId id="266" r:id="rId3"/>
+    <p:sldId id="259" r:id="rId4"/>
+    <p:sldId id="258" r:id="rId5"/>
+    <p:sldId id="260" r:id="rId6"/>
+    <p:sldId id="261" r:id="rId7"/>
+    <p:sldId id="262" r:id="rId8"/>
+    <p:sldId id="265" r:id="rId9"/>
+    <p:sldId id="263" r:id="rId10"/>
+    <p:sldId id="264" r:id="rId11"/>
   </p:sldIdLst>
   <p:sldSz cx="12192000" cy="6858000"/>
   <p:notesSz cx="6858000" cy="9144000"/>
@@ -269,7 +270,7 @@
           <a:p>
             <a:fld id="{0B28D0F6-6ABB-4527-9446-933655FCB222}" type="datetimeFigureOut">
               <a:rPr lang="de-CH" smtClean="0"/>
-              <a:t>06.01.2024</a:t>
+              <a:t>11.01.2024</a:t>
             </a:fld>
             <a:endParaRPr lang="de-CH"/>
           </a:p>
@@ -469,7 +470,7 @@
           <a:p>
             <a:fld id="{0B28D0F6-6ABB-4527-9446-933655FCB222}" type="datetimeFigureOut">
               <a:rPr lang="de-CH" smtClean="0"/>
-              <a:t>06.01.2024</a:t>
+              <a:t>11.01.2024</a:t>
             </a:fld>
             <a:endParaRPr lang="de-CH"/>
           </a:p>
@@ -679,7 +680,7 @@
           <a:p>
             <a:fld id="{0B28D0F6-6ABB-4527-9446-933655FCB222}" type="datetimeFigureOut">
               <a:rPr lang="de-CH" smtClean="0"/>
-              <a:t>06.01.2024</a:t>
+              <a:t>11.01.2024</a:t>
             </a:fld>
             <a:endParaRPr lang="de-CH"/>
           </a:p>
@@ -879,7 +880,7 @@
           <a:p>
             <a:fld id="{0B28D0F6-6ABB-4527-9446-933655FCB222}" type="datetimeFigureOut">
               <a:rPr lang="de-CH" smtClean="0"/>
-              <a:t>06.01.2024</a:t>
+              <a:t>11.01.2024</a:t>
             </a:fld>
             <a:endParaRPr lang="de-CH"/>
           </a:p>
@@ -1155,7 +1156,7 @@
           <a:p>
             <a:fld id="{0B28D0F6-6ABB-4527-9446-933655FCB222}" type="datetimeFigureOut">
               <a:rPr lang="de-CH" smtClean="0"/>
-              <a:t>06.01.2024</a:t>
+              <a:t>11.01.2024</a:t>
             </a:fld>
             <a:endParaRPr lang="de-CH"/>
           </a:p>
@@ -1423,7 +1424,7 @@
           <a:p>
             <a:fld id="{0B28D0F6-6ABB-4527-9446-933655FCB222}" type="datetimeFigureOut">
               <a:rPr lang="de-CH" smtClean="0"/>
-              <a:t>06.01.2024</a:t>
+              <a:t>11.01.2024</a:t>
             </a:fld>
             <a:endParaRPr lang="de-CH"/>
           </a:p>
@@ -1838,7 +1839,7 @@
           <a:p>
             <a:fld id="{0B28D0F6-6ABB-4527-9446-933655FCB222}" type="datetimeFigureOut">
               <a:rPr lang="de-CH" smtClean="0"/>
-              <a:t>06.01.2024</a:t>
+              <a:t>11.01.2024</a:t>
             </a:fld>
             <a:endParaRPr lang="de-CH"/>
           </a:p>
@@ -1980,7 +1981,7 @@
           <a:p>
             <a:fld id="{0B28D0F6-6ABB-4527-9446-933655FCB222}" type="datetimeFigureOut">
               <a:rPr lang="de-CH" smtClean="0"/>
-              <a:t>06.01.2024</a:t>
+              <a:t>11.01.2024</a:t>
             </a:fld>
             <a:endParaRPr lang="de-CH"/>
           </a:p>
@@ -2093,7 +2094,7 @@
           <a:p>
             <a:fld id="{0B28D0F6-6ABB-4527-9446-933655FCB222}" type="datetimeFigureOut">
               <a:rPr lang="de-CH" smtClean="0"/>
-              <a:t>06.01.2024</a:t>
+              <a:t>11.01.2024</a:t>
             </a:fld>
             <a:endParaRPr lang="de-CH"/>
           </a:p>
@@ -2406,7 +2407,7 @@
           <a:p>
             <a:fld id="{0B28D0F6-6ABB-4527-9446-933655FCB222}" type="datetimeFigureOut">
               <a:rPr lang="de-CH" smtClean="0"/>
-              <a:t>06.01.2024</a:t>
+              <a:t>11.01.2024</a:t>
             </a:fld>
             <a:endParaRPr lang="de-CH"/>
           </a:p>
@@ -2695,7 +2696,7 @@
           <a:p>
             <a:fld id="{0B28D0F6-6ABB-4527-9446-933655FCB222}" type="datetimeFigureOut">
               <a:rPr lang="de-CH" smtClean="0"/>
-              <a:t>06.01.2024</a:t>
+              <a:t>11.01.2024</a:t>
             </a:fld>
             <a:endParaRPr lang="de-CH"/>
           </a:p>
@@ -2938,7 +2939,7 @@
           <a:p>
             <a:fld id="{0B28D0F6-6ABB-4527-9446-933655FCB222}" type="datetimeFigureOut">
               <a:rPr lang="de-CH" smtClean="0"/>
-              <a:t>06.01.2024</a:t>
+              <a:t>11.01.2024</a:t>
             </a:fld>
             <a:endParaRPr lang="de-CH"/>
           </a:p>
@@ -3410,7 +3411,7 @@
         </p:nvSpPr>
         <p:spPr>
           <a:xfrm>
-            <a:off x="3859730" y="3232887"/>
+            <a:off x="5149515" y="3248960"/>
             <a:ext cx="5816867" cy="652328"/>
           </a:xfrm>
         </p:spPr>
@@ -3419,13 +3420,12 @@
           <a:lstStyle/>
           <a:p>
             <a:r>
-              <a:rPr lang="de-CH" dirty="0">
-                <a:solidFill>
-                  <a:srgbClr val="FCA50A"/>
-                </a:solidFill>
-              </a:rPr>
-              <a:t>Michael Mayer</a:t>
-            </a:r>
+              <a:rPr lang="de-CH" sz="2400" dirty="0">
+                <a:hlinkClick r:id="rId2"/>
+              </a:rPr>
+              <a:t>github.com/mayer79/demo_shapviz</a:t>
+            </a:r>
+            <a:endParaRPr lang="de-CH" sz="2400" dirty="0"/>
           </a:p>
         </p:txBody>
       </p:sp>
@@ -3444,7 +3444,7 @@
           <p:nvPr/>
         </p:nvPicPr>
         <p:blipFill>
-          <a:blip r:embed="rId2">
+          <a:blip r:embed="rId3">
             <a:extLst>
               <a:ext uri="{28A0092B-C50C-407E-A947-70E740481C1C}">
                 <a14:useLocalDpi xmlns:a14="http://schemas.microsoft.com/office/drawing/2010/main" val="0"/>
@@ -3480,7 +3480,7 @@
           <p:nvPr/>
         </p:nvPicPr>
         <p:blipFill>
-          <a:blip r:embed="rId3">
+          <a:blip r:embed="rId4">
             <a:extLst>
               <a:ext uri="{28A0092B-C50C-407E-A947-70E740481C1C}">
                 <a14:useLocalDpi xmlns:a14="http://schemas.microsoft.com/office/drawing/2010/main" val="0"/>
@@ -3514,6 +3514,320 @@
 </p:sld>
 </file>
 
+<file path=ppt/slides/slide10.xml><?xml version="1.0" encoding="utf-8"?>
+<p:sld xmlns:a="http://schemas.openxmlformats.org/drawingml/2006/main" xmlns:r="http://schemas.openxmlformats.org/officeDocument/2006/relationships" xmlns:p="http://schemas.openxmlformats.org/presentationml/2006/main">
+  <p:cSld>
+    <p:bg>
+      <p:bgRef idx="1001">
+        <a:schemeClr val="bg1"/>
+      </p:bgRef>
+    </p:bg>
+    <p:spTree>
+      <p:nvGrpSpPr>
+        <p:cNvPr id="1" name=""/>
+        <p:cNvGrpSpPr/>
+        <p:nvPr/>
+      </p:nvGrpSpPr>
+      <p:grpSpPr>
+        <a:xfrm>
+          <a:off x="0" y="0"/>
+          <a:ext cx="0" cy="0"/>
+          <a:chOff x="0" y="0"/>
+          <a:chExt cx="0" cy="0"/>
+        </a:xfrm>
+      </p:grpSpPr>
+      <p:sp>
+        <p:nvSpPr>
+          <p:cNvPr id="2" name="Titel 1">
+            <a:extLst>
+              <a:ext uri="{FF2B5EF4-FFF2-40B4-BE49-F238E27FC236}">
+                <a16:creationId xmlns:a16="http://schemas.microsoft.com/office/drawing/2014/main" id="{42E0CE1A-382F-ED02-C800-23EC79B88DB0}"/>
+              </a:ext>
+            </a:extLst>
+          </p:cNvPr>
+          <p:cNvSpPr>
+            <a:spLocks noGrp="1"/>
+          </p:cNvSpPr>
+          <p:nvPr>
+            <p:ph type="title"/>
+          </p:nvPr>
+        </p:nvSpPr>
+        <p:spPr/>
+        <p:txBody>
+          <a:bodyPr/>
+          <a:lstStyle/>
+          <a:p>
+            <a:r>
+              <a:rPr lang="de-CH" dirty="0">
+                <a:solidFill>
+                  <a:srgbClr val="430A69"/>
+                </a:solidFill>
+              </a:rPr>
+              <a:t>Resources</a:t>
+            </a:r>
+          </a:p>
+        </p:txBody>
+      </p:sp>
+      <p:sp>
+        <p:nvSpPr>
+          <p:cNvPr id="3" name="Textfeld 2">
+            <a:extLst>
+              <a:ext uri="{FF2B5EF4-FFF2-40B4-BE49-F238E27FC236}">
+                <a16:creationId xmlns:a16="http://schemas.microsoft.com/office/drawing/2014/main" id="{CFE42540-A8BA-21E8-5434-DCB0EAD57257}"/>
+              </a:ext>
+            </a:extLst>
+          </p:cNvPr>
+          <p:cNvSpPr txBox="1"/>
+          <p:nvPr/>
+        </p:nvSpPr>
+        <p:spPr>
+          <a:xfrm>
+            <a:off x="1126156" y="2107933"/>
+            <a:ext cx="10227644" cy="3877985"/>
+          </a:xfrm>
+          <a:prstGeom prst="rect">
+            <a:avLst/>
+          </a:prstGeom>
+          <a:noFill/>
+        </p:spPr>
+        <p:txBody>
+          <a:bodyPr wrap="square" rtlCol="0">
+            <a:spAutoFit/>
+          </a:bodyPr>
+          <a:lstStyle/>
+          <a:p>
+            <a:pPr marL="285750" indent="-285750">
+              <a:buFont typeface="Arial" panose="020B0604020202020204" pitchFamily="34" charset="0"/>
+              <a:buChar char="•"/>
+            </a:pPr>
+            <a:r>
+              <a:rPr lang="de-CH" sz="2400" dirty="0"/>
+              <a:t>Slides and </a:t>
+            </a:r>
+            <a:r>
+              <a:rPr lang="de-CH" sz="2400" dirty="0" err="1"/>
+              <a:t>demo</a:t>
+            </a:r>
+            <a:r>
+              <a:rPr lang="de-CH" sz="2400" dirty="0"/>
+              <a:t>: </a:t>
+            </a:r>
+            <a:r>
+              <a:rPr lang="de-CH" sz="2400" dirty="0">
+                <a:hlinkClick r:id="rId3"/>
+              </a:rPr>
+              <a:t>https://github.com/mayer79/demo_shapviz</a:t>
+            </a:r>
+            <a:br>
+              <a:rPr lang="de-CH" sz="2400" dirty="0"/>
+            </a:br>
+            <a:endParaRPr lang="de-CH" sz="2400" dirty="0"/>
+          </a:p>
+          <a:p>
+            <a:pPr marL="285750" indent="-285750">
+              <a:buFont typeface="Arial" panose="020B0604020202020204" pitchFamily="34" charset="0"/>
+              <a:buChar char="•"/>
+            </a:pPr>
+            <a:r>
+              <a:rPr lang="de-CH" dirty="0"/>
+              <a:t>{</a:t>
+            </a:r>
+            <a:r>
+              <a:rPr lang="de-CH" dirty="0" err="1"/>
+              <a:t>shapviz</a:t>
+            </a:r>
+            <a:r>
+              <a:rPr lang="de-CH" dirty="0"/>
+              <a:t>}: </a:t>
+            </a:r>
+            <a:r>
+              <a:rPr lang="de-CH" dirty="0">
+                <a:hlinkClick r:id="rId4"/>
+              </a:rPr>
+              <a:t>https://github.com/ModelOriented/shapviz</a:t>
+            </a:r>
+            <a:endParaRPr lang="de-CH" dirty="0"/>
+          </a:p>
+          <a:p>
+            <a:pPr marL="285750" indent="-285750">
+              <a:buFont typeface="Arial" panose="020B0604020202020204" pitchFamily="34" charset="0"/>
+              <a:buChar char="•"/>
+            </a:pPr>
+            <a:r>
+              <a:rPr lang="de-CH" dirty="0"/>
+              <a:t>{kernelshap}: </a:t>
+            </a:r>
+            <a:r>
+              <a:rPr lang="de-CH" dirty="0">
+                <a:hlinkClick r:id="rId5"/>
+              </a:rPr>
+              <a:t>https://github.com/ModelOriented/kernelshap</a:t>
+            </a:r>
+            <a:endParaRPr lang="de-CH" dirty="0"/>
+          </a:p>
+          <a:p>
+            <a:pPr marL="285750" indent="-285750">
+              <a:buFont typeface="Arial" panose="020B0604020202020204" pitchFamily="34" charset="0"/>
+              <a:buChar char="•"/>
+            </a:pPr>
+            <a:r>
+              <a:rPr lang="de-CH" dirty="0"/>
+              <a:t>Python: </a:t>
+            </a:r>
+            <a:r>
+              <a:rPr lang="de-CH" dirty="0">
+                <a:hlinkClick r:id="rId6"/>
+              </a:rPr>
+              <a:t>https://github.com/shap/shap</a:t>
+            </a:r>
+            <a:endParaRPr lang="de-CH" dirty="0"/>
+          </a:p>
+          <a:p>
+            <a:pPr marL="285750" indent="-285750">
+              <a:buFont typeface="Arial" panose="020B0604020202020204" pitchFamily="34" charset="0"/>
+              <a:buChar char="•"/>
+            </a:pPr>
+            <a:r>
+              <a:rPr lang="de-CH" dirty="0"/>
+              <a:t>Theory and code in R and Python: </a:t>
+            </a:r>
+            <a:br>
+              <a:rPr lang="en-US" b="0" i="0" dirty="0">
+                <a:solidFill>
+                  <a:srgbClr val="505050"/>
+                </a:solidFill>
+                <a:effectLst/>
+                <a:latin typeface="NexusSansWebPro"/>
+              </a:rPr>
+            </a:br>
+            <a:r>
+              <a:rPr lang="en-US" b="0" i="0" dirty="0">
+                <a:solidFill>
+                  <a:srgbClr val="505050"/>
+                </a:solidFill>
+                <a:effectLst/>
+                <a:latin typeface="NexusSansWebPro"/>
+              </a:rPr>
+              <a:t>SHAP for Actuaries: Explain any Model (2023)</a:t>
+            </a:r>
+            <a:br>
+              <a:rPr lang="en-US" b="0" i="0" dirty="0">
+                <a:solidFill>
+                  <a:srgbClr val="505050"/>
+                </a:solidFill>
+                <a:effectLst/>
+                <a:latin typeface="NexusSansWebPro"/>
+              </a:rPr>
+            </a:br>
+            <a:r>
+              <a:rPr lang="en-US" b="0" i="0" dirty="0">
+                <a:solidFill>
+                  <a:srgbClr val="505050"/>
+                </a:solidFill>
+                <a:effectLst/>
+                <a:latin typeface="NexusSansWebPro"/>
+              </a:rPr>
+              <a:t>Michael Mayer, Daniel Meier, and Mario V. Wüthrich</a:t>
+            </a:r>
+            <a:br>
+              <a:rPr lang="en-US" b="0" i="0" dirty="0">
+                <a:solidFill>
+                  <a:srgbClr val="505050"/>
+                </a:solidFill>
+                <a:effectLst/>
+                <a:latin typeface="NexusSansWebPro"/>
+              </a:rPr>
+            </a:br>
+            <a:r>
+              <a:rPr lang="en-US" b="0" i="0" u="sng" dirty="0">
+                <a:solidFill>
+                  <a:srgbClr val="505050"/>
+                </a:solidFill>
+                <a:effectLst/>
+                <a:latin typeface="NexusSansWebPro"/>
+                <a:hlinkClick r:id="rId7"/>
+              </a:rPr>
+              <a:t>http://dx.doi.org/10.2139/ssrn.4389797</a:t>
+            </a:r>
+            <a:endParaRPr lang="en-US" b="0" i="0" u="sng" dirty="0">
+              <a:solidFill>
+                <a:srgbClr val="505050"/>
+              </a:solidFill>
+              <a:effectLst/>
+              <a:latin typeface="NexusSansWebPro"/>
+            </a:endParaRPr>
+          </a:p>
+          <a:p>
+            <a:pPr marL="285750" indent="-285750">
+              <a:buFont typeface="Arial" panose="020B0604020202020204" pitchFamily="34" charset="0"/>
+              <a:buChar char="•"/>
+            </a:pPr>
+            <a:r>
+              <a:rPr lang="en-US" dirty="0"/>
+              <a:t>Original SHAP paper:</a:t>
+            </a:r>
+            <a:br>
+              <a:rPr lang="en-US" dirty="0"/>
+            </a:br>
+            <a:r>
+              <a:rPr lang="en-US" dirty="0">
+                <a:solidFill>
+                  <a:srgbClr val="505050"/>
+                </a:solidFill>
+                <a:latin typeface="NexusSansWebPro"/>
+              </a:rPr>
+              <a:t>A unified approach to interpreting model predictions (2017)</a:t>
+            </a:r>
+            <a:br>
+              <a:rPr lang="de-CH" dirty="0">
+                <a:solidFill>
+                  <a:srgbClr val="505050"/>
+                </a:solidFill>
+                <a:latin typeface="NexusSansWebPro"/>
+              </a:rPr>
+            </a:br>
+            <a:r>
+              <a:rPr lang="de-CH" dirty="0">
+                <a:solidFill>
+                  <a:srgbClr val="505050"/>
+                </a:solidFill>
+                <a:latin typeface="NexusSansWebPro"/>
+              </a:rPr>
+              <a:t>Scott Lundberg and Su-In Lee</a:t>
+            </a:r>
+            <a:br>
+              <a:rPr lang="de-CH" dirty="0">
+                <a:solidFill>
+                  <a:srgbClr val="505050"/>
+                </a:solidFill>
+                <a:latin typeface="NexusSansWebPro"/>
+              </a:rPr>
+            </a:br>
+            <a:r>
+              <a:rPr lang="en-US" dirty="0">
+                <a:solidFill>
+                  <a:srgbClr val="505050"/>
+                </a:solidFill>
+                <a:latin typeface="NexusSansWebPro"/>
+              </a:rPr>
+              <a:t>NIPS'17: Proceedings of the 31st International Conference on Neural Information Processing Systems</a:t>
+            </a:r>
+          </a:p>
+        </p:txBody>
+      </p:sp>
+    </p:spTree>
+    <p:extLst>
+      <p:ext uri="{BB962C8B-B14F-4D97-AF65-F5344CB8AC3E}">
+        <p14:creationId xmlns:p14="http://schemas.microsoft.com/office/powerpoint/2010/main" val="4156408452"/>
+      </p:ext>
+    </p:extLst>
+  </p:cSld>
+  <p:clrMapOvr>
+    <a:overrideClrMapping bg1="lt1" tx1="dk1" bg2="lt2" tx2="dk2" accent1="accent1" accent2="accent2" accent3="accent3" accent4="accent4" accent5="accent5" accent6="accent6" hlink="hlink" folHlink="folHlink"/>
+  </p:clrMapOvr>
+</p:sld>
+</file>
+
 <file path=ppt/slides/slide2.xml><?xml version="1.0" encoding="utf-8"?>
 <p:sld xmlns:a="http://schemas.openxmlformats.org/drawingml/2006/main" xmlns:r="http://schemas.openxmlformats.org/officeDocument/2006/relationships" xmlns:p="http://schemas.openxmlformats.org/presentationml/2006/main">
   <p:cSld>
@@ -3555,77 +3869,23 @@
         </p:spPr>
         <p:txBody>
           <a:bodyPr>
-            <a:normAutofit fontScale="90000"/>
+            <a:normAutofit/>
           </a:bodyPr>
           <a:lstStyle/>
           <a:p>
             <a:r>
-              <a:rPr lang="de-CH" dirty="0" err="1">
-                <a:solidFill>
-                  <a:srgbClr val="FCA50A"/>
-                </a:solidFill>
-              </a:rPr>
-              <a:t>SH</a:t>
-            </a:r>
-            <a:r>
-              <a:rPr lang="de-CH" dirty="0" err="1"/>
-              <a:t>apley</a:t>
-            </a:r>
-            <a:r>
-              <a:rPr lang="de-CH" dirty="0"/>
-              <a:t> </a:t>
-            </a:r>
-            <a:r>
-              <a:rPr lang="de-CH" dirty="0">
-                <a:solidFill>
-                  <a:srgbClr val="FCA50A"/>
-                </a:solidFill>
-              </a:rPr>
-              <a:t>A</a:t>
-            </a:r>
-            <a:r>
-              <a:rPr lang="de-CH" dirty="0"/>
-              <a:t>dditive </a:t>
-            </a:r>
-            <a:r>
-              <a:rPr lang="de-CH" dirty="0" err="1"/>
-              <a:t>ex</a:t>
-            </a:r>
-            <a:r>
-              <a:rPr lang="de-CH" dirty="0" err="1">
-                <a:solidFill>
-                  <a:srgbClr val="FCA50A"/>
-                </a:solidFill>
-              </a:rPr>
-              <a:t>P</a:t>
-            </a:r>
-            <a:r>
-              <a:rPr lang="de-CH" dirty="0" err="1"/>
-              <a:t>lanations</a:t>
-            </a:r>
-            <a:r>
-              <a:rPr lang="de-CH" dirty="0"/>
-              <a:t> </a:t>
-            </a:r>
-            <a:r>
-              <a:rPr lang="de-CH"/>
-              <a:t>(Lundberg-Lee, </a:t>
-            </a:r>
-            <a:r>
-              <a:rPr lang="de-CH" dirty="0"/>
-              <a:t>2017)</a:t>
-            </a:r>
-            <a:br>
-              <a:rPr lang="de-CH" dirty="0"/>
-            </a:br>
-            <a:r>
-              <a:rPr lang="de-CH" sz="3600" dirty="0">
+              <a:rPr lang="de-CH" sz="4400" dirty="0">
                 <a:solidFill>
                   <a:srgbClr val="430A69"/>
                 </a:solidFill>
               </a:rPr>
-              <a:t>Illustrated on Miami House Price Model</a:t>
-            </a:r>
+              <a:t>Miami House Prices</a:t>
+            </a:r>
+            <a:endParaRPr lang="de-CH" sz="3600" dirty="0">
+              <a:solidFill>
+                <a:srgbClr val="430A69"/>
+              </a:solidFill>
+            </a:endParaRPr>
           </a:p>
         </p:txBody>
       </p:sp>
@@ -3676,99 +3936,105 @@
               <a:buNone/>
             </a:pPr>
             <a:r>
+              <a:rPr lang="de-CH" dirty="0">
+                <a:solidFill>
+                  <a:srgbClr val="FCA50A"/>
+                </a:solidFill>
+              </a:rPr>
+              <a:t>Data</a:t>
+            </a:r>
+          </a:p>
+          <a:p>
+            <a:r>
               <a:rPr lang="de-CH" dirty="0"/>
-              <a:t>SHAP </a:t>
+              <a:t>14k </a:t>
             </a:r>
             <a:r>
               <a:rPr lang="de-CH" dirty="0" err="1"/>
-              <a:t>decomposes</a:t>
-            </a:r>
+              <a:t>observations</a:t>
+            </a:r>
+            <a:endParaRPr lang="de-CH" dirty="0"/>
+          </a:p>
+          <a:p>
             <a:r>
               <a:rPr lang="de-CH" dirty="0"/>
-              <a:t> a </a:t>
+              <a:t>Response: log(</a:t>
             </a:r>
             <a:r>
               <a:rPr lang="de-CH" dirty="0" err="1"/>
-              <a:t>model</a:t>
+              <a:t>price</a:t>
             </a:r>
             <a:r>
               <a:rPr lang="de-CH" dirty="0"/>
-              <a:t> </a:t>
+              <a:t>)</a:t>
+            </a:r>
+          </a:p>
+          <a:p>
+            <a:r>
+              <a:rPr lang="de-CH" dirty="0"/>
+              <a:t>Features </a:t>
             </a:r>
             <a:r>
               <a:rPr lang="de-CH" dirty="0" err="1"/>
-              <a:t>prediction</a:t>
+              <a:t>we</a:t>
             </a:r>
             <a:r>
               <a:rPr lang="de-CH" dirty="0"/>
-              <a:t> </a:t>
-            </a:r>
-            <a:r>
-              <a:rPr lang="de-CH" dirty="0" err="1">
-                <a:solidFill>
-                  <a:srgbClr val="FCA50A"/>
-                </a:solidFill>
-              </a:rPr>
-              <a:t>fairly</a:t>
+              <a:t> will </a:t>
+            </a:r>
+            <a:r>
+              <a:rPr lang="de-CH" dirty="0" err="1"/>
+              <a:t>use</a:t>
             </a:r>
             <a:r>
               <a:rPr lang="de-CH" dirty="0"/>
-              <a:t> </a:t>
-            </a:r>
-            <a:r>
-              <a:rPr lang="de-CH" dirty="0" err="1"/>
-              <a:t>into</a:t>
-            </a:r>
-            <a:r>
-              <a:rPr lang="de-CH" dirty="0"/>
-              <a:t> additive </a:t>
-            </a:r>
-            <a:r>
-              <a:rPr lang="de-CH" dirty="0" err="1"/>
-              <a:t>contributions</a:t>
-            </a:r>
-            <a:r>
-              <a:rPr lang="de-CH" dirty="0"/>
-              <a:t> </a:t>
-            </a:r>
-            <a:r>
-              <a:rPr lang="de-CH" dirty="0" err="1"/>
-              <a:t>of</a:t>
-            </a:r>
-            <a:r>
-              <a:rPr lang="de-CH" dirty="0"/>
-              <a:t> </a:t>
-            </a:r>
-            <a:r>
-              <a:rPr lang="de-CH" dirty="0" err="1"/>
-              <a:t>the</a:t>
-            </a:r>
-            <a:r>
-              <a:rPr lang="de-CH" dirty="0"/>
-              <a:t> </a:t>
-            </a:r>
-            <a:r>
-              <a:rPr lang="de-CH" dirty="0" err="1"/>
-              <a:t>features</a:t>
-            </a:r>
-            <a:endParaRPr lang="de-CH" dirty="0"/>
-          </a:p>
-          <a:p>
-            <a:endParaRPr lang="de-CH" dirty="0"/>
-          </a:p>
-          <a:p>
-            <a:endParaRPr lang="de-CH" dirty="0"/>
-          </a:p>
-          <a:p>
-            <a:endParaRPr lang="de-CH" dirty="0"/>
-          </a:p>
-          <a:p>
-            <a:endParaRPr lang="de-CH" dirty="0"/>
-          </a:p>
-          <a:p>
-            <a:endParaRPr lang="de-CH" dirty="0"/>
-          </a:p>
-          <a:p>
+              <a:t>:</a:t>
+            </a:r>
+          </a:p>
+          <a:p>
+            <a:pPr lvl="1"/>
+            <a:r>
+              <a:rPr lang="en-US" dirty="0" err="1"/>
+              <a:t>center_dist</a:t>
+            </a:r>
+            <a:endParaRPr lang="en-US" dirty="0"/>
+          </a:p>
+          <a:p>
+            <a:pPr lvl="1"/>
+            <a:r>
+              <a:rPr lang="en-US" dirty="0"/>
+              <a:t>log_living</a:t>
+            </a:r>
+          </a:p>
+          <a:p>
+            <a:pPr lvl="1"/>
+            <a:r>
+              <a:rPr lang="en-US" dirty="0" err="1"/>
+              <a:t>log_land</a:t>
+            </a:r>
+            <a:endParaRPr lang="en-US" dirty="0"/>
+          </a:p>
+          <a:p>
+            <a:pPr lvl="1"/>
+            <a:r>
+              <a:rPr lang="en-US" dirty="0" err="1"/>
+              <a:t>structure_quality</a:t>
+            </a:r>
+            <a:endParaRPr lang="en-US" dirty="0"/>
+          </a:p>
+          <a:p>
+            <a:pPr lvl="1"/>
+            <a:r>
+              <a:rPr lang="en-US" dirty="0"/>
+              <a:t>age</a:t>
+            </a:r>
+          </a:p>
+          <a:p>
+            <a:pPr lvl="1"/>
+            <a:r>
+              <a:rPr lang="en-US" dirty="0" err="1"/>
+              <a:t>month_sold</a:t>
+            </a:r>
             <a:endParaRPr lang="de-CH" dirty="0"/>
           </a:p>
         </p:txBody>
@@ -3995,71 +4261,13 @@
                   <a:srgbClr val="FCA50A"/>
                 </a:solidFill>
               </a:rPr>
-              <a:t>Repeat </a:t>
-            </a:r>
-            <a:r>
-              <a:rPr lang="de-CH" dirty="0" err="1"/>
-              <a:t>for</a:t>
-            </a:r>
+              <a:t>Model</a:t>
+            </a:r>
+          </a:p>
+          <a:p>
             <a:r>
               <a:rPr lang="de-CH" dirty="0"/>
-              <a:t> </a:t>
-            </a:r>
-            <a:r>
-              <a:rPr lang="de-CH" dirty="0" err="1"/>
-              <a:t>many</a:t>
-            </a:r>
-            <a:r>
-              <a:rPr lang="de-CH" dirty="0"/>
-              <a:t> </a:t>
-            </a:r>
-            <a:r>
-              <a:rPr lang="de-CH" dirty="0" err="1"/>
-              <a:t>predictions</a:t>
-            </a:r>
-            <a:r>
-              <a:rPr lang="de-CH" dirty="0"/>
-              <a:t> </a:t>
-            </a:r>
-            <a:r>
-              <a:rPr lang="de-CH" dirty="0" err="1"/>
-              <a:t>to</a:t>
-            </a:r>
-            <a:r>
-              <a:rPr lang="de-CH" dirty="0"/>
-              <a:t> </a:t>
-            </a:r>
-            <a:r>
-              <a:rPr lang="de-CH" dirty="0" err="1"/>
-              <a:t>describe</a:t>
-            </a:r>
-            <a:r>
-              <a:rPr lang="de-CH" dirty="0"/>
-              <a:t> </a:t>
-            </a:r>
-            <a:r>
-              <a:rPr lang="de-CH" dirty="0" err="1"/>
-              <a:t>model</a:t>
-            </a:r>
-            <a:r>
-              <a:rPr lang="de-CH" dirty="0"/>
-              <a:t> </a:t>
-            </a:r>
-            <a:r>
-              <a:rPr lang="de-CH" dirty="0" err="1"/>
-              <a:t>as</a:t>
-            </a:r>
-            <a:r>
-              <a:rPr lang="de-CH" dirty="0"/>
-              <a:t> a </a:t>
-            </a:r>
-            <a:r>
-              <a:rPr lang="de-CH" dirty="0" err="1">
-                <a:solidFill>
-                  <a:srgbClr val="FCA50A"/>
-                </a:solidFill>
-              </a:rPr>
-              <a:t>whole</a:t>
+              <a:t>XGBoost</a:t>
             </a:r>
             <a:endParaRPr lang="de-CH" dirty="0">
               <a:solidFill>
@@ -4068,7 +4276,612 @@
             </a:endParaRPr>
           </a:p>
           <a:p>
+            <a:r>
+              <a:rPr lang="de-CH" dirty="0"/>
+              <a:t>80% </a:t>
+            </a:r>
+            <a:r>
+              <a:rPr lang="de-CH" dirty="0" err="1"/>
+              <a:t>training</a:t>
+            </a:r>
+            <a:r>
+              <a:rPr lang="de-CH" dirty="0"/>
+              <a:t> </a:t>
+            </a:r>
+            <a:r>
+              <a:rPr lang="de-CH" dirty="0" err="1"/>
+              <a:t>rows</a:t>
+            </a:r>
             <a:endParaRPr lang="de-CH" dirty="0"/>
+          </a:p>
+          <a:p>
+            <a:r>
+              <a:rPr lang="de-CH" dirty="0"/>
+              <a:t>20% </a:t>
+            </a:r>
+            <a:r>
+              <a:rPr lang="de-CH" dirty="0" err="1"/>
+              <a:t>validation</a:t>
+            </a:r>
+            <a:endParaRPr lang="de-CH" dirty="0"/>
+          </a:p>
+          <a:p>
+            <a:r>
+              <a:rPr lang="de-CH" dirty="0" err="1"/>
+              <a:t>Squared</a:t>
+            </a:r>
+            <a:r>
+              <a:rPr lang="de-CH" dirty="0"/>
+              <a:t> </a:t>
+            </a:r>
+            <a:r>
+              <a:rPr lang="de-CH" dirty="0" err="1"/>
+              <a:t>error</a:t>
+            </a:r>
+            <a:r>
+              <a:rPr lang="de-CH" dirty="0"/>
+              <a:t> </a:t>
+            </a:r>
+            <a:r>
+              <a:rPr lang="de-CH" dirty="0" err="1"/>
+              <a:t>loss</a:t>
+            </a:r>
+            <a:endParaRPr lang="de-CH" dirty="0"/>
+          </a:p>
+          <a:p>
+            <a:r>
+              <a:rPr lang="de-CH" dirty="0" err="1"/>
+              <a:t>Could</a:t>
+            </a:r>
+            <a:r>
+              <a:rPr lang="de-CH" dirty="0"/>
+              <a:t> </a:t>
+            </a:r>
+            <a:r>
+              <a:rPr lang="de-CH" dirty="0" err="1"/>
+              <a:t>be</a:t>
+            </a:r>
+            <a:r>
+              <a:rPr lang="de-CH" dirty="0"/>
+              <a:t> </a:t>
+            </a:r>
+            <a:r>
+              <a:rPr lang="de-CH" dirty="0" err="1"/>
+              <a:t>improved</a:t>
+            </a:r>
+            <a:endParaRPr lang="de-CH" dirty="0"/>
+          </a:p>
+          <a:p>
+            <a:endParaRPr lang="de-CH" dirty="0"/>
+          </a:p>
+        </p:txBody>
+      </p:sp>
+    </p:spTree>
+    <p:extLst>
+      <p:ext uri="{BB962C8B-B14F-4D97-AF65-F5344CB8AC3E}">
+        <p14:creationId xmlns:p14="http://schemas.microsoft.com/office/powerpoint/2010/main" val="168038549"/>
+      </p:ext>
+    </p:extLst>
+  </p:cSld>
+  <p:clrMapOvr>
+    <a:masterClrMapping/>
+  </p:clrMapOvr>
+</p:sld>
+</file>
+
+<file path=ppt/slides/slide3.xml><?xml version="1.0" encoding="utf-8"?>
+<p:sld xmlns:a="http://schemas.openxmlformats.org/drawingml/2006/main" xmlns:r="http://schemas.openxmlformats.org/officeDocument/2006/relationships" xmlns:p="http://schemas.openxmlformats.org/presentationml/2006/main">
+  <p:cSld>
+    <p:spTree>
+      <p:nvGrpSpPr>
+        <p:cNvPr id="1" name=""/>
+        <p:cNvGrpSpPr/>
+        <p:nvPr/>
+      </p:nvGrpSpPr>
+      <p:grpSpPr>
+        <a:xfrm>
+          <a:off x="0" y="0"/>
+          <a:ext cx="0" cy="0"/>
+          <a:chOff x="0" y="0"/>
+          <a:chExt cx="0" cy="0"/>
+        </a:xfrm>
+      </p:grpSpPr>
+      <p:sp>
+        <p:nvSpPr>
+          <p:cNvPr id="2" name="Titel 1">
+            <a:extLst>
+              <a:ext uri="{FF2B5EF4-FFF2-40B4-BE49-F238E27FC236}">
+                <a16:creationId xmlns:a16="http://schemas.microsoft.com/office/drawing/2014/main" id="{42E0CE1A-382F-ED02-C800-23EC79B88DB0}"/>
+              </a:ext>
+            </a:extLst>
+          </p:cNvPr>
+          <p:cNvSpPr>
+            <a:spLocks noGrp="1"/>
+          </p:cNvSpPr>
+          <p:nvPr>
+            <p:ph type="title"/>
+          </p:nvPr>
+        </p:nvSpPr>
+        <p:spPr>
+          <a:xfrm>
+            <a:off x="838200" y="365125"/>
+            <a:ext cx="10837244" cy="1325563"/>
+          </a:xfrm>
+        </p:spPr>
+        <p:txBody>
+          <a:bodyPr>
+            <a:normAutofit fontScale="90000"/>
+          </a:bodyPr>
+          <a:lstStyle/>
+          <a:p>
+            <a:r>
+              <a:rPr lang="de-CH" dirty="0" err="1">
+                <a:solidFill>
+                  <a:srgbClr val="FCA50A"/>
+                </a:solidFill>
+              </a:rPr>
+              <a:t>SH</a:t>
+            </a:r>
+            <a:r>
+              <a:rPr lang="de-CH" dirty="0" err="1"/>
+              <a:t>apley</a:t>
+            </a:r>
+            <a:r>
+              <a:rPr lang="de-CH" dirty="0"/>
+              <a:t> </a:t>
+            </a:r>
+            <a:r>
+              <a:rPr lang="de-CH" dirty="0">
+                <a:solidFill>
+                  <a:srgbClr val="FCA50A"/>
+                </a:solidFill>
+              </a:rPr>
+              <a:t>A</a:t>
+            </a:r>
+            <a:r>
+              <a:rPr lang="de-CH" dirty="0"/>
+              <a:t>dditive </a:t>
+            </a:r>
+            <a:r>
+              <a:rPr lang="de-CH" dirty="0" err="1"/>
+              <a:t>ex</a:t>
+            </a:r>
+            <a:r>
+              <a:rPr lang="de-CH" dirty="0" err="1">
+                <a:solidFill>
+                  <a:srgbClr val="FCA50A"/>
+                </a:solidFill>
+              </a:rPr>
+              <a:t>P</a:t>
+            </a:r>
+            <a:r>
+              <a:rPr lang="de-CH" dirty="0" err="1"/>
+              <a:t>lanations</a:t>
+            </a:r>
+            <a:r>
+              <a:rPr lang="de-CH" dirty="0"/>
+              <a:t> (Lundberg-Lee, 2017)</a:t>
+            </a:r>
+            <a:br>
+              <a:rPr lang="de-CH" dirty="0"/>
+            </a:br>
+            <a:endParaRPr lang="de-CH" sz="3600" dirty="0">
+              <a:solidFill>
+                <a:srgbClr val="430A69"/>
+              </a:solidFill>
+            </a:endParaRPr>
+          </a:p>
+        </p:txBody>
+      </p:sp>
+      <p:sp>
+        <p:nvSpPr>
+          <p:cNvPr id="3" name="Inhaltsplatzhalter 2">
+            <a:extLst>
+              <a:ext uri="{FF2B5EF4-FFF2-40B4-BE49-F238E27FC236}">
+                <a16:creationId xmlns:a16="http://schemas.microsoft.com/office/drawing/2014/main" id="{4244D7DB-EE49-135C-4A3B-537039D7FA75}"/>
+              </a:ext>
+            </a:extLst>
+          </p:cNvPr>
+          <p:cNvSpPr>
+            <a:spLocks noGrp="1"/>
+          </p:cNvSpPr>
+          <p:nvPr>
+            <p:ph idx="1"/>
+          </p:nvPr>
+        </p:nvSpPr>
+        <p:spPr>
+          <a:xfrm>
+            <a:off x="770335" y="1594618"/>
+            <a:ext cx="5188090" cy="4806181"/>
+          </a:xfrm>
+          <a:ln w="57150"/>
+        </p:spPr>
+        <p:style>
+          <a:lnRef idx="2">
+            <a:schemeClr val="accent4"/>
+          </a:lnRef>
+          <a:fillRef idx="1">
+            <a:schemeClr val="lt1"/>
+          </a:fillRef>
+          <a:effectRef idx="0">
+            <a:schemeClr val="accent4"/>
+          </a:effectRef>
+          <a:fontRef idx="minor">
+            <a:schemeClr val="dk1"/>
+          </a:fontRef>
+        </p:style>
+        <p:txBody>
+          <a:bodyPr>
+            <a:normAutofit/>
+          </a:bodyPr>
+          <a:lstStyle/>
+          <a:p>
+            <a:pPr marL="0" indent="0">
+              <a:buNone/>
+            </a:pPr>
+            <a:r>
+              <a:rPr lang="de-CH" dirty="0" err="1"/>
+              <a:t>Decompose</a:t>
+            </a:r>
+            <a:r>
+              <a:rPr lang="de-CH" dirty="0"/>
+              <a:t> </a:t>
+            </a:r>
+            <a:r>
+              <a:rPr lang="de-CH" dirty="0" err="1"/>
+              <a:t>prediction</a:t>
+            </a:r>
+            <a:r>
+              <a:rPr lang="de-CH" dirty="0"/>
+              <a:t> </a:t>
+            </a:r>
+            <a:r>
+              <a:rPr lang="de-CH" dirty="0" err="1">
+                <a:solidFill>
+                  <a:srgbClr val="FCA50A"/>
+                </a:solidFill>
+              </a:rPr>
+              <a:t>fairly</a:t>
+            </a:r>
+            <a:r>
+              <a:rPr lang="de-CH" dirty="0"/>
+              <a:t> </a:t>
+            </a:r>
+            <a:r>
+              <a:rPr lang="de-CH" dirty="0" err="1"/>
+              <a:t>into</a:t>
+            </a:r>
+            <a:r>
+              <a:rPr lang="de-CH" dirty="0"/>
+              <a:t> </a:t>
+            </a:r>
+            <a:r>
+              <a:rPr lang="de-CH" dirty="0" err="1"/>
+              <a:t>contributions</a:t>
+            </a:r>
+            <a:r>
+              <a:rPr lang="de-CH" dirty="0"/>
+              <a:t> </a:t>
+            </a:r>
+            <a:r>
+              <a:rPr lang="de-CH" dirty="0" err="1"/>
+              <a:t>of</a:t>
+            </a:r>
+            <a:r>
+              <a:rPr lang="de-CH" dirty="0"/>
+              <a:t> </a:t>
+            </a:r>
+            <a:r>
+              <a:rPr lang="de-CH" dirty="0" err="1"/>
+              <a:t>the</a:t>
+            </a:r>
+            <a:r>
+              <a:rPr lang="de-CH" dirty="0"/>
+              <a:t> </a:t>
+            </a:r>
+            <a:r>
+              <a:rPr lang="de-CH" dirty="0" err="1"/>
+              <a:t>features</a:t>
+            </a:r>
+            <a:endParaRPr lang="de-CH" dirty="0"/>
+          </a:p>
+          <a:p>
+            <a:endParaRPr lang="de-CH" dirty="0"/>
+          </a:p>
+          <a:p>
+            <a:endParaRPr lang="de-CH" dirty="0"/>
+          </a:p>
+          <a:p>
+            <a:endParaRPr lang="de-CH" dirty="0"/>
+          </a:p>
+          <a:p>
+            <a:endParaRPr lang="de-CH" dirty="0"/>
+          </a:p>
+          <a:p>
+            <a:endParaRPr lang="de-CH" dirty="0"/>
+          </a:p>
+          <a:p>
+            <a:endParaRPr lang="de-CH" dirty="0"/>
+          </a:p>
+        </p:txBody>
+      </p:sp>
+      <p:sp>
+        <p:nvSpPr>
+          <p:cNvPr id="10" name="Inhaltsplatzhalter 2">
+            <a:extLst>
+              <a:ext uri="{FF2B5EF4-FFF2-40B4-BE49-F238E27FC236}">
+                <a16:creationId xmlns:a16="http://schemas.microsoft.com/office/drawing/2014/main" id="{F7009E7A-1019-E61F-60EA-44CD7AE1BB80}"/>
+              </a:ext>
+            </a:extLst>
+          </p:cNvPr>
+          <p:cNvSpPr txBox="1">
+            <a:spLocks/>
+          </p:cNvSpPr>
+          <p:nvPr/>
+        </p:nvSpPr>
+        <p:spPr>
+          <a:xfrm>
+            <a:off x="5958425" y="1594617"/>
+            <a:ext cx="5288670" cy="4806181"/>
+          </a:xfrm>
+          <a:prstGeom prst="rect">
+            <a:avLst/>
+          </a:prstGeom>
+          <a:ln w="57150" cap="flat" cmpd="sng" algn="ctr">
+            <a:solidFill>
+              <a:schemeClr val="accent4"/>
+            </a:solidFill>
+            <a:prstDash val="solid"/>
+            <a:miter lim="800000"/>
+          </a:ln>
+        </p:spPr>
+        <p:style>
+          <a:lnRef idx="2">
+            <a:schemeClr val="accent4"/>
+          </a:lnRef>
+          <a:fillRef idx="1">
+            <a:schemeClr val="lt1"/>
+          </a:fillRef>
+          <a:effectRef idx="0">
+            <a:schemeClr val="accent4"/>
+          </a:effectRef>
+          <a:fontRef idx="minor">
+            <a:schemeClr val="dk1"/>
+          </a:fontRef>
+        </p:style>
+        <p:txBody>
+          <a:bodyPr vert="horz" lIns="91440" tIns="45720" rIns="91440" bIns="45720" rtlCol="0">
+            <a:normAutofit/>
+          </a:bodyPr>
+          <a:lstStyle>
+            <a:lvl1pPr marL="228600" indent="-228600" algn="l" defTabSz="914400" rtl="0" eaLnBrk="1" latinLnBrk="0" hangingPunct="1">
+              <a:lnSpc>
+                <a:spcPct val="90000"/>
+              </a:lnSpc>
+              <a:spcBef>
+                <a:spcPts val="1000"/>
+              </a:spcBef>
+              <a:buFont typeface="Arial" panose="020B0604020202020204" pitchFamily="34" charset="0"/>
+              <a:buChar char="•"/>
+              <a:defRPr sz="2800" kern="1200">
+                <a:solidFill>
+                  <a:schemeClr val="dk1"/>
+                </a:solidFill>
+                <a:latin typeface="+mn-lt"/>
+                <a:ea typeface="+mn-ea"/>
+                <a:cs typeface="+mn-cs"/>
+              </a:defRPr>
+            </a:lvl1pPr>
+            <a:lvl2pPr marL="685800" indent="-228600" algn="l" defTabSz="914400" rtl="0" eaLnBrk="1" latinLnBrk="0" hangingPunct="1">
+              <a:lnSpc>
+                <a:spcPct val="90000"/>
+              </a:lnSpc>
+              <a:spcBef>
+                <a:spcPts val="500"/>
+              </a:spcBef>
+              <a:buFont typeface="Arial" panose="020B0604020202020204" pitchFamily="34" charset="0"/>
+              <a:buChar char="•"/>
+              <a:defRPr sz="2400" kern="1200">
+                <a:solidFill>
+                  <a:schemeClr val="dk1"/>
+                </a:solidFill>
+                <a:latin typeface="+mn-lt"/>
+                <a:ea typeface="+mn-ea"/>
+                <a:cs typeface="+mn-cs"/>
+              </a:defRPr>
+            </a:lvl2pPr>
+            <a:lvl3pPr marL="1143000" indent="-228600" algn="l" defTabSz="914400" rtl="0" eaLnBrk="1" latinLnBrk="0" hangingPunct="1">
+              <a:lnSpc>
+                <a:spcPct val="90000"/>
+              </a:lnSpc>
+              <a:spcBef>
+                <a:spcPts val="500"/>
+              </a:spcBef>
+              <a:buFont typeface="Arial" panose="020B0604020202020204" pitchFamily="34" charset="0"/>
+              <a:buChar char="•"/>
+              <a:defRPr sz="2000" kern="1200">
+                <a:solidFill>
+                  <a:schemeClr val="dk1"/>
+                </a:solidFill>
+                <a:latin typeface="+mn-lt"/>
+                <a:ea typeface="+mn-ea"/>
+                <a:cs typeface="+mn-cs"/>
+              </a:defRPr>
+            </a:lvl3pPr>
+            <a:lvl4pPr marL="1600200" indent="-228600" algn="l" defTabSz="914400" rtl="0" eaLnBrk="1" latinLnBrk="0" hangingPunct="1">
+              <a:lnSpc>
+                <a:spcPct val="90000"/>
+              </a:lnSpc>
+              <a:spcBef>
+                <a:spcPts val="500"/>
+              </a:spcBef>
+              <a:buFont typeface="Arial" panose="020B0604020202020204" pitchFamily="34" charset="0"/>
+              <a:buChar char="•"/>
+              <a:defRPr sz="1800" kern="1200">
+                <a:solidFill>
+                  <a:schemeClr val="dk1"/>
+                </a:solidFill>
+                <a:latin typeface="+mn-lt"/>
+                <a:ea typeface="+mn-ea"/>
+                <a:cs typeface="+mn-cs"/>
+              </a:defRPr>
+            </a:lvl4pPr>
+            <a:lvl5pPr marL="2057400" indent="-228600" algn="l" defTabSz="914400" rtl="0" eaLnBrk="1" latinLnBrk="0" hangingPunct="1">
+              <a:lnSpc>
+                <a:spcPct val="90000"/>
+              </a:lnSpc>
+              <a:spcBef>
+                <a:spcPts val="500"/>
+              </a:spcBef>
+              <a:buFont typeface="Arial" panose="020B0604020202020204" pitchFamily="34" charset="0"/>
+              <a:buChar char="•"/>
+              <a:defRPr sz="1800" kern="1200">
+                <a:solidFill>
+                  <a:schemeClr val="dk1"/>
+                </a:solidFill>
+                <a:latin typeface="+mn-lt"/>
+                <a:ea typeface="+mn-ea"/>
+                <a:cs typeface="+mn-cs"/>
+              </a:defRPr>
+            </a:lvl5pPr>
+            <a:lvl6pPr marL="2514600" indent="-228600" algn="l" defTabSz="914400" rtl="0" eaLnBrk="1" latinLnBrk="0" hangingPunct="1">
+              <a:lnSpc>
+                <a:spcPct val="90000"/>
+              </a:lnSpc>
+              <a:spcBef>
+                <a:spcPts val="500"/>
+              </a:spcBef>
+              <a:buFont typeface="Arial" panose="020B0604020202020204" pitchFamily="34" charset="0"/>
+              <a:buChar char="•"/>
+              <a:defRPr sz="1800" kern="1200">
+                <a:solidFill>
+                  <a:schemeClr val="dk1"/>
+                </a:solidFill>
+                <a:latin typeface="+mn-lt"/>
+                <a:ea typeface="+mn-ea"/>
+                <a:cs typeface="+mn-cs"/>
+              </a:defRPr>
+            </a:lvl6pPr>
+            <a:lvl7pPr marL="2971800" indent="-228600" algn="l" defTabSz="914400" rtl="0" eaLnBrk="1" latinLnBrk="0" hangingPunct="1">
+              <a:lnSpc>
+                <a:spcPct val="90000"/>
+              </a:lnSpc>
+              <a:spcBef>
+                <a:spcPts val="500"/>
+              </a:spcBef>
+              <a:buFont typeface="Arial" panose="020B0604020202020204" pitchFamily="34" charset="0"/>
+              <a:buChar char="•"/>
+              <a:defRPr sz="1800" kern="1200">
+                <a:solidFill>
+                  <a:schemeClr val="dk1"/>
+                </a:solidFill>
+                <a:latin typeface="+mn-lt"/>
+                <a:ea typeface="+mn-ea"/>
+                <a:cs typeface="+mn-cs"/>
+              </a:defRPr>
+            </a:lvl7pPr>
+            <a:lvl8pPr marL="3429000" indent="-228600" algn="l" defTabSz="914400" rtl="0" eaLnBrk="1" latinLnBrk="0" hangingPunct="1">
+              <a:lnSpc>
+                <a:spcPct val="90000"/>
+              </a:lnSpc>
+              <a:spcBef>
+                <a:spcPts val="500"/>
+              </a:spcBef>
+              <a:buFont typeface="Arial" panose="020B0604020202020204" pitchFamily="34" charset="0"/>
+              <a:buChar char="•"/>
+              <a:defRPr sz="1800" kern="1200">
+                <a:solidFill>
+                  <a:schemeClr val="dk1"/>
+                </a:solidFill>
+                <a:latin typeface="+mn-lt"/>
+                <a:ea typeface="+mn-ea"/>
+                <a:cs typeface="+mn-cs"/>
+              </a:defRPr>
+            </a:lvl8pPr>
+            <a:lvl9pPr marL="3886200" indent="-228600" algn="l" defTabSz="914400" rtl="0" eaLnBrk="1" latinLnBrk="0" hangingPunct="1">
+              <a:lnSpc>
+                <a:spcPct val="90000"/>
+              </a:lnSpc>
+              <a:spcBef>
+                <a:spcPts val="500"/>
+              </a:spcBef>
+              <a:buFont typeface="Arial" panose="020B0604020202020204" pitchFamily="34" charset="0"/>
+              <a:buChar char="•"/>
+              <a:defRPr sz="1800" kern="1200">
+                <a:solidFill>
+                  <a:schemeClr val="dk1"/>
+                </a:solidFill>
+                <a:latin typeface="+mn-lt"/>
+                <a:ea typeface="+mn-ea"/>
+                <a:cs typeface="+mn-cs"/>
+              </a:defRPr>
+            </a:lvl9pPr>
+          </a:lstStyle>
+          <a:p>
+            <a:pPr marL="0" indent="0">
+              <a:buNone/>
+            </a:pPr>
+            <a:r>
+              <a:rPr lang="de-CH" dirty="0">
+                <a:solidFill>
+                  <a:srgbClr val="FCA50A"/>
+                </a:solidFill>
+              </a:rPr>
+              <a:t>Repeat </a:t>
+            </a:r>
+            <a:r>
+              <a:rPr lang="de-CH" dirty="0" err="1"/>
+              <a:t>for</a:t>
+            </a:r>
+            <a:r>
+              <a:rPr lang="de-CH" dirty="0"/>
+              <a:t> </a:t>
+            </a:r>
+            <a:r>
+              <a:rPr lang="de-CH" dirty="0" err="1"/>
+              <a:t>many</a:t>
+            </a:r>
+            <a:r>
+              <a:rPr lang="de-CH" dirty="0"/>
+              <a:t> </a:t>
+            </a:r>
+            <a:r>
+              <a:rPr lang="de-CH" dirty="0" err="1"/>
+              <a:t>predictions</a:t>
+            </a:r>
+            <a:r>
+              <a:rPr lang="de-CH" dirty="0"/>
+              <a:t> </a:t>
+            </a:r>
+            <a:r>
+              <a:rPr lang="de-CH" dirty="0" err="1"/>
+              <a:t>to</a:t>
+            </a:r>
+            <a:r>
+              <a:rPr lang="de-CH" dirty="0"/>
+              <a:t> </a:t>
+            </a:r>
+            <a:r>
+              <a:rPr lang="de-CH" dirty="0" err="1"/>
+              <a:t>describe</a:t>
+            </a:r>
+            <a:r>
+              <a:rPr lang="de-CH" dirty="0"/>
+              <a:t> </a:t>
+            </a:r>
+            <a:r>
+              <a:rPr lang="de-CH" dirty="0" err="1">
+                <a:solidFill>
+                  <a:srgbClr val="FCA50A"/>
+                </a:solidFill>
+              </a:rPr>
+              <a:t>model</a:t>
+            </a:r>
+            <a:endParaRPr lang="de-CH" dirty="0">
+              <a:solidFill>
+                <a:srgbClr val="FCA50A"/>
+              </a:solidFill>
+            </a:endParaRPr>
           </a:p>
           <a:p>
             <a:endParaRPr lang="de-CH" dirty="0"/>
@@ -4150,6 +4963,87 @@
           </a:prstGeom>
         </p:spPr>
       </p:pic>
+      <p:cxnSp>
+        <p:nvCxnSpPr>
+          <p:cNvPr id="6" name="Gerade Verbindung mit Pfeil 5">
+            <a:extLst>
+              <a:ext uri="{FF2B5EF4-FFF2-40B4-BE49-F238E27FC236}">
+                <a16:creationId xmlns:a16="http://schemas.microsoft.com/office/drawing/2014/main" id="{283BBC71-C695-4262-CD0E-72A132A3C74E}"/>
+              </a:ext>
+            </a:extLst>
+          </p:cNvPr>
+          <p:cNvCxnSpPr>
+            <a:cxnSpLocks/>
+          </p:cNvCxnSpPr>
+          <p:nvPr/>
+        </p:nvCxnSpPr>
+        <p:spPr>
+          <a:xfrm flipH="1">
+            <a:off x="3128018" y="2714324"/>
+            <a:ext cx="409425" cy="205857"/>
+          </a:xfrm>
+          <a:prstGeom prst="straightConnector1">
+            <a:avLst/>
+          </a:prstGeom>
+          <a:ln>
+            <a:tailEnd type="triangle"/>
+          </a:ln>
+        </p:spPr>
+        <p:style>
+          <a:lnRef idx="1">
+            <a:schemeClr val="accent1"/>
+          </a:lnRef>
+          <a:fillRef idx="0">
+            <a:schemeClr val="accent1"/>
+          </a:fillRef>
+          <a:effectRef idx="0">
+            <a:schemeClr val="accent1"/>
+          </a:effectRef>
+          <a:fontRef idx="minor">
+            <a:schemeClr val="tx1"/>
+          </a:fontRef>
+        </p:style>
+      </p:cxnSp>
+      <p:sp>
+        <p:nvSpPr>
+          <p:cNvPr id="8" name="Textfeld 7">
+            <a:extLst>
+              <a:ext uri="{FF2B5EF4-FFF2-40B4-BE49-F238E27FC236}">
+                <a16:creationId xmlns:a16="http://schemas.microsoft.com/office/drawing/2014/main" id="{3871559E-E18C-B755-BBCC-B0BE741AEDC1}"/>
+              </a:ext>
+            </a:extLst>
+          </p:cNvPr>
+          <p:cNvSpPr txBox="1"/>
+          <p:nvPr/>
+        </p:nvSpPr>
+        <p:spPr>
+          <a:xfrm>
+            <a:off x="3537443" y="2526708"/>
+            <a:ext cx="2270365" cy="369332"/>
+          </a:xfrm>
+          <a:prstGeom prst="rect">
+            <a:avLst/>
+          </a:prstGeom>
+          <a:noFill/>
+        </p:spPr>
+        <p:txBody>
+          <a:bodyPr wrap="none" rtlCol="0">
+            <a:spAutoFit/>
+          </a:bodyPr>
+          <a:lstStyle/>
+          <a:p>
+            <a:r>
+              <a:rPr lang="de-CH" dirty="0"/>
+              <a:t>328k USD = </a:t>
+            </a:r>
+            <a:r>
+              <a:rPr lang="de-CH" dirty="0" err="1"/>
+              <a:t>prediction</a:t>
+            </a:r>
+            <a:endParaRPr lang="de-CH" dirty="0"/>
+          </a:p>
+        </p:txBody>
+      </p:sp>
     </p:spTree>
     <p:extLst>
       <p:ext uri="{BB962C8B-B14F-4D97-AF65-F5344CB8AC3E}">
@@ -4163,7 +5057,7 @@
 </p:sld>
 </file>
 
-<file path=ppt/slides/slide3.xml><?xml version="1.0" encoding="utf-8"?>
+<file path=ppt/slides/slide4.xml><?xml version="1.0" encoding="utf-8"?>
 <p:sld xmlns:a="http://schemas.openxmlformats.org/drawingml/2006/main" xmlns:r="http://schemas.openxmlformats.org/officeDocument/2006/relationships" xmlns:p="http://schemas.openxmlformats.org/presentationml/2006/main">
   <p:cSld>
     <p:spTree>
@@ -5153,7 +6047,7 @@
 </p:sld>
 </file>
 
-<file path=ppt/slides/slide4.xml><?xml version="1.0" encoding="utf-8"?>
+<file path=ppt/slides/slide5.xml><?xml version="1.0" encoding="utf-8"?>
 <p:sld xmlns:a="http://schemas.openxmlformats.org/drawingml/2006/main" xmlns:r="http://schemas.openxmlformats.org/officeDocument/2006/relationships" xmlns:p="http://schemas.openxmlformats.org/presentationml/2006/main">
   <p:cSld>
     <p:spTree>
@@ -5613,7 +6507,7 @@
 </p:sld>
 </file>
 
-<file path=ppt/slides/slide5.xml><?xml version="1.0" encoding="utf-8"?>
+<file path=ppt/slides/slide6.xml><?xml version="1.0" encoding="utf-8"?>
 <p:sld xmlns:a="http://schemas.openxmlformats.org/drawingml/2006/main" xmlns:r="http://schemas.openxmlformats.org/officeDocument/2006/relationships" xmlns:p="http://schemas.openxmlformats.org/presentationml/2006/main">
   <p:cSld>
     <p:spTree>
@@ -6313,111 +7207,6 @@
 </p:sld>
 </file>
 
-<file path=ppt/slides/slide6.xml><?xml version="1.0" encoding="utf-8"?>
-<p:sld xmlns:a="http://schemas.openxmlformats.org/drawingml/2006/main" xmlns:r="http://schemas.openxmlformats.org/officeDocument/2006/relationships" xmlns:p="http://schemas.openxmlformats.org/presentationml/2006/main">
-  <p:cSld>
-    <p:bg>
-      <p:bgRef idx="1001">
-        <a:schemeClr val="bg1"/>
-      </p:bgRef>
-    </p:bg>
-    <p:spTree>
-      <p:nvGrpSpPr>
-        <p:cNvPr id="1" name=""/>
-        <p:cNvGrpSpPr/>
-        <p:nvPr/>
-      </p:nvGrpSpPr>
-      <p:grpSpPr>
-        <a:xfrm>
-          <a:off x="0" y="0"/>
-          <a:ext cx="0" cy="0"/>
-          <a:chOff x="0" y="0"/>
-          <a:chExt cx="0" cy="0"/>
-        </a:xfrm>
-      </p:grpSpPr>
-      <p:sp>
-        <p:nvSpPr>
-          <p:cNvPr id="2" name="Titel 1">
-            <a:extLst>
-              <a:ext uri="{FF2B5EF4-FFF2-40B4-BE49-F238E27FC236}">
-                <a16:creationId xmlns:a16="http://schemas.microsoft.com/office/drawing/2014/main" id="{42E0CE1A-382F-ED02-C800-23EC79B88DB0}"/>
-              </a:ext>
-            </a:extLst>
-          </p:cNvPr>
-          <p:cNvSpPr>
-            <a:spLocks noGrp="1"/>
-          </p:cNvSpPr>
-          <p:nvPr>
-            <p:ph type="title"/>
-          </p:nvPr>
-        </p:nvSpPr>
-        <p:spPr/>
-        <p:txBody>
-          <a:bodyPr/>
-          <a:lstStyle/>
-          <a:p>
-            <a:r>
-              <a:rPr lang="de-CH" dirty="0">
-                <a:solidFill>
-                  <a:srgbClr val="430A69"/>
-                </a:solidFill>
-              </a:rPr>
-              <a:t>Demo in R</a:t>
-            </a:r>
-          </a:p>
-        </p:txBody>
-      </p:sp>
-      <p:sp>
-        <p:nvSpPr>
-          <p:cNvPr id="4" name="Textfeld 3">
-            <a:extLst>
-              <a:ext uri="{FF2B5EF4-FFF2-40B4-BE49-F238E27FC236}">
-                <a16:creationId xmlns:a16="http://schemas.microsoft.com/office/drawing/2014/main" id="{D9FFB1C4-D1FF-79B3-F785-D82ADDACA188}"/>
-              </a:ext>
-            </a:extLst>
-          </p:cNvPr>
-          <p:cNvSpPr txBox="1"/>
-          <p:nvPr/>
-        </p:nvSpPr>
-        <p:spPr>
-          <a:xfrm>
-            <a:off x="960119" y="2890605"/>
-            <a:ext cx="8482263" cy="646331"/>
-          </a:xfrm>
-          <a:prstGeom prst="rect">
-            <a:avLst/>
-          </a:prstGeom>
-          <a:noFill/>
-        </p:spPr>
-        <p:txBody>
-          <a:bodyPr wrap="square">
-            <a:spAutoFit/>
-          </a:bodyPr>
-          <a:lstStyle/>
-          <a:p>
-            <a:r>
-              <a:rPr lang="de-CH" sz="3600" dirty="0">
-                <a:hlinkClick r:id="rId3"/>
-              </a:rPr>
-              <a:t>https://github.com/mayer79/demo_shapviz</a:t>
-            </a:r>
-            <a:endParaRPr lang="de-CH" sz="3600" dirty="0"/>
-          </a:p>
-        </p:txBody>
-      </p:sp>
-    </p:spTree>
-    <p:extLst>
-      <p:ext uri="{BB962C8B-B14F-4D97-AF65-F5344CB8AC3E}">
-        <p14:creationId xmlns:p14="http://schemas.microsoft.com/office/powerpoint/2010/main" val="3326022566"/>
-      </p:ext>
-    </p:extLst>
-  </p:cSld>
-  <p:clrMapOvr>
-    <a:overrideClrMapping bg1="lt1" tx1="dk1" bg2="lt2" tx2="dk2" accent1="accent1" accent2="accent2" accent3="accent3" accent4="accent4" accent5="accent5" accent6="accent6" hlink="hlink" folHlink="folHlink"/>
-  </p:clrMapOvr>
-</p:sld>
-</file>
-
 <file path=ppt/slides/slide7.xml><?xml version="1.0" encoding="utf-8"?>
 <p:sld xmlns:a="http://schemas.openxmlformats.org/drawingml/2006/main" xmlns:r="http://schemas.openxmlformats.org/officeDocument/2006/relationships" xmlns:p="http://schemas.openxmlformats.org/presentationml/2006/main">
   <p:cSld>
@@ -6467,46 +7256,17 @@
                   <a:srgbClr val="430A69"/>
                 </a:solidFill>
               </a:rPr>
-              <a:t>Things </a:t>
-            </a:r>
-            <a:r>
-              <a:rPr lang="de-CH" dirty="0" err="1">
-                <a:solidFill>
-                  <a:srgbClr val="430A69"/>
-                </a:solidFill>
-              </a:rPr>
-              <a:t>to</a:t>
-            </a:r>
-            <a:r>
-              <a:rPr lang="de-CH" dirty="0">
-                <a:solidFill>
-                  <a:srgbClr val="430A69"/>
-                </a:solidFill>
-              </a:rPr>
-              <a:t> </a:t>
-            </a:r>
-            <a:r>
-              <a:rPr lang="de-CH" dirty="0" err="1">
-                <a:solidFill>
-                  <a:srgbClr val="430A69"/>
-                </a:solidFill>
-              </a:rPr>
-              <a:t>Explore</a:t>
-            </a:r>
-            <a:endParaRPr lang="de-CH" dirty="0">
-              <a:solidFill>
-                <a:srgbClr val="430A69"/>
-              </a:solidFill>
-            </a:endParaRPr>
-          </a:p>
-        </p:txBody>
-      </p:sp>
-      <p:sp>
-        <p:nvSpPr>
-          <p:cNvPr id="3" name="Textfeld 2">
-            <a:extLst>
-              <a:ext uri="{FF2B5EF4-FFF2-40B4-BE49-F238E27FC236}">
-                <a16:creationId xmlns:a16="http://schemas.microsoft.com/office/drawing/2014/main" id="{890E3696-09C5-2E75-5C23-9F13EA764785}"/>
+              <a:t>Demo in R</a:t>
+            </a:r>
+          </a:p>
+        </p:txBody>
+      </p:sp>
+      <p:sp>
+        <p:nvSpPr>
+          <p:cNvPr id="4" name="Textfeld 3">
+            <a:extLst>
+              <a:ext uri="{FF2B5EF4-FFF2-40B4-BE49-F238E27FC236}">
+                <a16:creationId xmlns:a16="http://schemas.microsoft.com/office/drawing/2014/main" id="{D9FFB1C4-D1FF-79B3-F785-D82ADDACA188}"/>
               </a:ext>
             </a:extLst>
           </p:cNvPr>
@@ -6515,8 +7275,8 @@
         </p:nvSpPr>
         <p:spPr>
           <a:xfrm>
-            <a:off x="1001026" y="2146434"/>
-            <a:ext cx="9298005" cy="2954655"/>
+            <a:off x="960119" y="2890605"/>
+            <a:ext cx="8482263" cy="646331"/>
           </a:xfrm>
           <a:prstGeom prst="rect">
             <a:avLst/>
@@ -6524,301 +7284,25 @@
           <a:noFill/>
         </p:spPr>
         <p:txBody>
-          <a:bodyPr wrap="square" rtlCol="0">
+          <a:bodyPr wrap="square">
             <a:spAutoFit/>
           </a:bodyPr>
           <a:lstStyle/>
           <a:p>
-            <a:pPr marL="285750" indent="-285750">
-              <a:buFont typeface="Arial" panose="020B0604020202020204" pitchFamily="34" charset="0"/>
-              <a:buChar char="•"/>
-            </a:pPr>
-            <a:r>
-              <a:rPr lang="de-CH" sz="2800" dirty="0"/>
-              <a:t>SHAP </a:t>
-            </a:r>
-            <a:r>
-              <a:rPr lang="de-CH" sz="2800" dirty="0" err="1"/>
-              <a:t>interactions</a:t>
-            </a:r>
-            <a:endParaRPr lang="de-CH" sz="2800" dirty="0"/>
-          </a:p>
-          <a:p>
-            <a:pPr marL="285750" indent="-285750">
-              <a:buFont typeface="Arial" panose="020B0604020202020204" pitchFamily="34" charset="0"/>
-              <a:buChar char="•"/>
-            </a:pPr>
-            <a:r>
-              <a:rPr lang="de-CH" sz="2800" dirty="0"/>
-              <a:t>Multivariate </a:t>
-            </a:r>
-            <a:r>
-              <a:rPr lang="de-CH" sz="2800" dirty="0" err="1"/>
-              <a:t>output</a:t>
-            </a:r>
-            <a:r>
-              <a:rPr lang="de-CH" sz="2800" dirty="0"/>
-              <a:t> (e.g., multi-</a:t>
-            </a:r>
-            <a:r>
-              <a:rPr lang="de-CH" sz="2800" dirty="0" err="1"/>
-              <a:t>class</a:t>
-            </a:r>
-            <a:r>
-              <a:rPr lang="de-CH" sz="2800" dirty="0"/>
-              <a:t> </a:t>
-            </a:r>
-            <a:r>
-              <a:rPr lang="de-CH" sz="2800" dirty="0" err="1"/>
-              <a:t>classification</a:t>
-            </a:r>
-            <a:r>
-              <a:rPr lang="de-CH" sz="2800" dirty="0"/>
-              <a:t>)</a:t>
-            </a:r>
-          </a:p>
-          <a:p>
-            <a:pPr marL="285750" indent="-285750">
-              <a:buFont typeface="Arial" panose="020B0604020202020204" pitchFamily="34" charset="0"/>
-              <a:buChar char="•"/>
-            </a:pPr>
-            <a:r>
-              <a:rPr lang="de-CH" sz="2800" dirty="0" err="1"/>
-              <a:t>How</a:t>
-            </a:r>
-            <a:r>
-              <a:rPr lang="de-CH" sz="2800" dirty="0"/>
-              <a:t> do TreeSHAP, Permutation SHAP, Kernel SHAP </a:t>
-            </a:r>
-            <a:r>
-              <a:rPr lang="de-CH" sz="2800" dirty="0" err="1"/>
-              <a:t>work</a:t>
-            </a:r>
-            <a:r>
-              <a:rPr lang="de-CH" sz="2800" dirty="0"/>
-              <a:t>?</a:t>
-            </a:r>
-          </a:p>
-          <a:p>
-            <a:pPr marL="285750" indent="-285750">
-              <a:buFont typeface="Arial" panose="020B0604020202020204" pitchFamily="34" charset="0"/>
-              <a:buChar char="•"/>
-            </a:pPr>
-            <a:r>
-              <a:rPr lang="de-CH" sz="2800" dirty="0"/>
-              <a:t>Feature </a:t>
-            </a:r>
-            <a:r>
-              <a:rPr lang="de-CH" sz="2800" dirty="0" err="1"/>
-              <a:t>construction</a:t>
-            </a:r>
-            <a:r>
-              <a:rPr lang="de-CH" sz="2800" dirty="0"/>
-              <a:t> </a:t>
-            </a:r>
-            <a:r>
-              <a:rPr lang="de-CH" sz="2800" dirty="0" err="1"/>
-              <a:t>is</a:t>
-            </a:r>
-            <a:r>
-              <a:rPr lang="de-CH" sz="2800" dirty="0"/>
-              <a:t> relevant: not </a:t>
-            </a:r>
-            <a:r>
-              <a:rPr lang="de-CH" sz="2800" dirty="0" err="1"/>
-              <a:t>too</a:t>
-            </a:r>
-            <a:r>
-              <a:rPr lang="de-CH" sz="2800" dirty="0"/>
-              <a:t> </a:t>
-            </a:r>
-            <a:r>
-              <a:rPr lang="de-CH" sz="2800" dirty="0" err="1"/>
-              <a:t>correlated</a:t>
-            </a:r>
-            <a:r>
-              <a:rPr lang="de-CH" sz="2800" dirty="0"/>
-              <a:t> </a:t>
-            </a:r>
-            <a:r>
-              <a:rPr lang="de-CH" sz="2800" dirty="0" err="1"/>
-              <a:t>features</a:t>
-            </a:r>
-            <a:r>
-              <a:rPr lang="de-CH" sz="2800" dirty="0"/>
-              <a:t>!</a:t>
-            </a:r>
-          </a:p>
-          <a:p>
-            <a:endParaRPr lang="de-CH" sz="2800" dirty="0"/>
-          </a:p>
-          <a:p>
-            <a:r>
-              <a:rPr lang="de-CH" sz="2800" dirty="0">
-                <a:solidFill>
-                  <a:srgbClr val="430A69"/>
-                </a:solidFill>
-              </a:rPr>
-              <a:t>A SHAP </a:t>
-            </a:r>
-            <a:r>
-              <a:rPr lang="de-CH" sz="2800" dirty="0" err="1">
-                <a:solidFill>
-                  <a:srgbClr val="430A69"/>
-                </a:solidFill>
-              </a:rPr>
-              <a:t>analysis</a:t>
-            </a:r>
-            <a:r>
-              <a:rPr lang="de-CH" sz="2800" dirty="0">
-                <a:solidFill>
-                  <a:srgbClr val="430A69"/>
-                </a:solidFill>
-              </a:rPr>
-              <a:t> </a:t>
-            </a:r>
-            <a:r>
-              <a:rPr lang="de-CH" sz="2800" dirty="0" err="1">
-                <a:solidFill>
-                  <a:srgbClr val="430A69"/>
-                </a:solidFill>
-              </a:rPr>
-              <a:t>is</a:t>
-            </a:r>
-            <a:r>
-              <a:rPr lang="de-CH" sz="2800" dirty="0">
-                <a:solidFill>
-                  <a:srgbClr val="430A69"/>
-                </a:solidFill>
-              </a:rPr>
-              <a:t> </a:t>
-            </a:r>
-            <a:r>
-              <a:rPr lang="de-CH" sz="2800" dirty="0" err="1">
-                <a:solidFill>
-                  <a:srgbClr val="430A69"/>
-                </a:solidFill>
-              </a:rPr>
-              <a:t>as</a:t>
-            </a:r>
-            <a:r>
-              <a:rPr lang="de-CH" sz="2800" dirty="0">
-                <a:solidFill>
-                  <a:srgbClr val="430A69"/>
-                </a:solidFill>
-              </a:rPr>
-              <a:t> </a:t>
-            </a:r>
-            <a:r>
-              <a:rPr lang="de-CH" sz="2800" dirty="0" err="1">
-                <a:solidFill>
-                  <a:srgbClr val="430A69"/>
-                </a:solidFill>
-              </a:rPr>
-              <a:t>good</a:t>
-            </a:r>
-            <a:r>
-              <a:rPr lang="de-CH" sz="2800" dirty="0">
-                <a:solidFill>
-                  <a:srgbClr val="430A69"/>
-                </a:solidFill>
-              </a:rPr>
-              <a:t> </a:t>
-            </a:r>
-            <a:r>
-              <a:rPr lang="de-CH" sz="2800" dirty="0" err="1">
-                <a:solidFill>
-                  <a:srgbClr val="430A69"/>
-                </a:solidFill>
-              </a:rPr>
-              <a:t>or</a:t>
-            </a:r>
-            <a:r>
-              <a:rPr lang="de-CH" sz="2800" dirty="0">
-                <a:solidFill>
-                  <a:srgbClr val="430A69"/>
-                </a:solidFill>
-              </a:rPr>
-              <a:t> </a:t>
-            </a:r>
-            <a:r>
-              <a:rPr lang="de-CH" sz="2800" dirty="0" err="1">
-                <a:solidFill>
-                  <a:srgbClr val="430A69"/>
-                </a:solidFill>
-              </a:rPr>
-              <a:t>bad</a:t>
-            </a:r>
-            <a:r>
-              <a:rPr lang="de-CH" sz="2800" dirty="0">
-                <a:solidFill>
-                  <a:srgbClr val="430A69"/>
-                </a:solidFill>
-              </a:rPr>
-              <a:t> </a:t>
-            </a:r>
-            <a:r>
-              <a:rPr lang="de-CH" sz="2800" dirty="0" err="1">
-                <a:solidFill>
-                  <a:srgbClr val="430A69"/>
-                </a:solidFill>
-              </a:rPr>
-              <a:t>as</a:t>
-            </a:r>
-            <a:r>
-              <a:rPr lang="de-CH" sz="2800" dirty="0">
-                <a:solidFill>
-                  <a:srgbClr val="430A69"/>
-                </a:solidFill>
-              </a:rPr>
-              <a:t> </a:t>
-            </a:r>
-            <a:r>
-              <a:rPr lang="de-CH" sz="2800" dirty="0" err="1">
-                <a:solidFill>
-                  <a:srgbClr val="430A69"/>
-                </a:solidFill>
-              </a:rPr>
-              <a:t>your</a:t>
-            </a:r>
-            <a:r>
-              <a:rPr lang="de-CH" sz="2800" dirty="0">
-                <a:solidFill>
-                  <a:srgbClr val="430A69"/>
-                </a:solidFill>
-              </a:rPr>
-              <a:t> </a:t>
-            </a:r>
-            <a:r>
-              <a:rPr lang="de-CH" sz="2800" dirty="0" err="1">
-                <a:solidFill>
-                  <a:srgbClr val="430A69"/>
-                </a:solidFill>
-              </a:rPr>
-              <a:t>model</a:t>
-            </a:r>
-            <a:r>
-              <a:rPr lang="de-CH" sz="2800" dirty="0">
-                <a:solidFill>
-                  <a:srgbClr val="430A69"/>
-                </a:solidFill>
-              </a:rPr>
-              <a:t>!</a:t>
-            </a:r>
-          </a:p>
-          <a:p>
-            <a:pPr marL="285750" indent="-285750">
-              <a:buFont typeface="Arial" panose="020B0604020202020204" pitchFamily="34" charset="0"/>
-              <a:buChar char="•"/>
-            </a:pPr>
-            <a:endParaRPr lang="de-CH" dirty="0"/>
+            <a:r>
+              <a:rPr lang="de-CH" sz="3600" dirty="0">
+                <a:hlinkClick r:id="rId3"/>
+              </a:rPr>
+              <a:t>https://github.com/mayer79/demo_shapviz</a:t>
+            </a:r>
+            <a:endParaRPr lang="de-CH" sz="3600" dirty="0"/>
           </a:p>
         </p:txBody>
       </p:sp>
     </p:spTree>
     <p:extLst>
       <p:ext uri="{BB962C8B-B14F-4D97-AF65-F5344CB8AC3E}">
-        <p14:creationId xmlns:p14="http://schemas.microsoft.com/office/powerpoint/2010/main" val="135354231"/>
+        <p14:creationId xmlns:p14="http://schemas.microsoft.com/office/powerpoint/2010/main" val="3326022566"/>
       </p:ext>
     </p:extLst>
   </p:cSld>
@@ -6866,33 +7350,369 @@
             <p:ph type="title"/>
           </p:nvPr>
         </p:nvSpPr>
+        <p:spPr/>
+        <p:txBody>
+          <a:bodyPr/>
+          <a:lstStyle/>
+          <a:p>
+            <a:r>
+              <a:rPr lang="de-CH" dirty="0">
+                <a:solidFill>
+                  <a:srgbClr val="430A69"/>
+                </a:solidFill>
+              </a:rPr>
+              <a:t>Things </a:t>
+            </a:r>
+            <a:r>
+              <a:rPr lang="de-CH" dirty="0" err="1">
+                <a:solidFill>
+                  <a:srgbClr val="430A69"/>
+                </a:solidFill>
+              </a:rPr>
+              <a:t>to</a:t>
+            </a:r>
+            <a:r>
+              <a:rPr lang="de-CH" dirty="0">
+                <a:solidFill>
+                  <a:srgbClr val="430A69"/>
+                </a:solidFill>
+              </a:rPr>
+              <a:t> </a:t>
+            </a:r>
+            <a:r>
+              <a:rPr lang="de-CH" dirty="0" err="1">
+                <a:solidFill>
+                  <a:srgbClr val="430A69"/>
+                </a:solidFill>
+              </a:rPr>
+              <a:t>Explore</a:t>
+            </a:r>
+            <a:endParaRPr lang="de-CH" dirty="0">
+              <a:solidFill>
+                <a:srgbClr val="430A69"/>
+              </a:solidFill>
+            </a:endParaRPr>
+          </a:p>
+        </p:txBody>
+      </p:sp>
+      <p:sp>
+        <p:nvSpPr>
+          <p:cNvPr id="3" name="Textfeld 2">
+            <a:extLst>
+              <a:ext uri="{FF2B5EF4-FFF2-40B4-BE49-F238E27FC236}">
+                <a16:creationId xmlns:a16="http://schemas.microsoft.com/office/drawing/2014/main" id="{890E3696-09C5-2E75-5C23-9F13EA764785}"/>
+              </a:ext>
+            </a:extLst>
+          </p:cNvPr>
+          <p:cNvSpPr txBox="1"/>
+          <p:nvPr/>
+        </p:nvSpPr>
         <p:spPr>
           <a:xfrm>
-            <a:off x="3080887" y="2442093"/>
-            <a:ext cx="6236368" cy="1973814"/>
+            <a:off x="1001026" y="2146434"/>
+            <a:ext cx="9298005" cy="2954655"/>
           </a:xfrm>
+          <a:prstGeom prst="rect">
+            <a:avLst/>
+          </a:prstGeom>
+          <a:noFill/>
         </p:spPr>
         <p:txBody>
-          <a:bodyPr>
-            <a:noAutofit/>
+          <a:bodyPr wrap="square" rtlCol="0">
+            <a:spAutoFit/>
           </a:bodyPr>
           <a:lstStyle/>
           <a:p>
-            <a:r>
-              <a:rPr lang="de-CH" sz="9600" dirty="0">
+            <a:pPr marL="285750" indent="-285750">
+              <a:buFont typeface="Arial" panose="020B0604020202020204" pitchFamily="34" charset="0"/>
+              <a:buChar char="•"/>
+            </a:pPr>
+            <a:r>
+              <a:rPr lang="de-CH" sz="2800" dirty="0"/>
+              <a:t>SHAP </a:t>
+            </a:r>
+            <a:r>
+              <a:rPr lang="de-CH" sz="2800" dirty="0" err="1"/>
+              <a:t>interactions</a:t>
+            </a:r>
+            <a:endParaRPr lang="de-CH" sz="2800" dirty="0"/>
+          </a:p>
+          <a:p>
+            <a:pPr marL="285750" indent="-285750">
+              <a:buFont typeface="Arial" panose="020B0604020202020204" pitchFamily="34" charset="0"/>
+              <a:buChar char="•"/>
+            </a:pPr>
+            <a:r>
+              <a:rPr lang="de-CH" sz="2800" dirty="0"/>
+              <a:t>Multivariate </a:t>
+            </a:r>
+            <a:r>
+              <a:rPr lang="de-CH" sz="2800" dirty="0" err="1"/>
+              <a:t>output</a:t>
+            </a:r>
+            <a:r>
+              <a:rPr lang="de-CH" sz="2800" dirty="0"/>
+              <a:t> (e.g., multi-</a:t>
+            </a:r>
+            <a:r>
+              <a:rPr lang="de-CH" sz="2800" dirty="0" err="1"/>
+              <a:t>class</a:t>
+            </a:r>
+            <a:r>
+              <a:rPr lang="de-CH" sz="2800" dirty="0"/>
+              <a:t> </a:t>
+            </a:r>
+            <a:r>
+              <a:rPr lang="de-CH" sz="2800" dirty="0" err="1"/>
+              <a:t>classification</a:t>
+            </a:r>
+            <a:r>
+              <a:rPr lang="de-CH" sz="2800" dirty="0"/>
+              <a:t>)</a:t>
+            </a:r>
+          </a:p>
+          <a:p>
+            <a:pPr marL="285750" indent="-285750">
+              <a:buFont typeface="Arial" panose="020B0604020202020204" pitchFamily="34" charset="0"/>
+              <a:buChar char="•"/>
+            </a:pPr>
+            <a:r>
+              <a:rPr lang="de-CH" sz="2800" dirty="0" err="1"/>
+              <a:t>How</a:t>
+            </a:r>
+            <a:r>
+              <a:rPr lang="de-CH" sz="2800" dirty="0"/>
+              <a:t> do TreeSHAP, Permutation SHAP, Kernel SHAP </a:t>
+            </a:r>
+            <a:r>
+              <a:rPr lang="de-CH" sz="2800" dirty="0" err="1"/>
+              <a:t>work</a:t>
+            </a:r>
+            <a:r>
+              <a:rPr lang="de-CH" sz="2800" dirty="0"/>
+              <a:t>?</a:t>
+            </a:r>
+          </a:p>
+          <a:p>
+            <a:pPr marL="285750" indent="-285750">
+              <a:buFont typeface="Arial" panose="020B0604020202020204" pitchFamily="34" charset="0"/>
+              <a:buChar char="•"/>
+            </a:pPr>
+            <a:r>
+              <a:rPr lang="de-CH" sz="2800" dirty="0"/>
+              <a:t>Feature </a:t>
+            </a:r>
+            <a:r>
+              <a:rPr lang="de-CH" sz="2800" dirty="0" err="1"/>
+              <a:t>construction</a:t>
+            </a:r>
+            <a:r>
+              <a:rPr lang="de-CH" sz="2800" dirty="0"/>
+              <a:t> </a:t>
+            </a:r>
+            <a:r>
+              <a:rPr lang="de-CH" sz="2800" dirty="0" err="1"/>
+              <a:t>is</a:t>
+            </a:r>
+            <a:r>
+              <a:rPr lang="de-CH" sz="2800" dirty="0"/>
+              <a:t> relevant: not </a:t>
+            </a:r>
+            <a:r>
+              <a:rPr lang="de-CH" sz="2800" dirty="0" err="1"/>
+              <a:t>too</a:t>
+            </a:r>
+            <a:r>
+              <a:rPr lang="de-CH" sz="2800" dirty="0"/>
+              <a:t> </a:t>
+            </a:r>
+            <a:r>
+              <a:rPr lang="de-CH" sz="2800" dirty="0" err="1"/>
+              <a:t>correlated</a:t>
+            </a:r>
+            <a:r>
+              <a:rPr lang="de-CH" sz="2800" dirty="0"/>
+              <a:t> </a:t>
+            </a:r>
+            <a:r>
+              <a:rPr lang="de-CH" sz="2800" dirty="0" err="1"/>
+              <a:t>features</a:t>
+            </a:r>
+            <a:r>
+              <a:rPr lang="de-CH" sz="2800" dirty="0"/>
+              <a:t>!</a:t>
+            </a:r>
+          </a:p>
+          <a:p>
+            <a:endParaRPr lang="de-CH" sz="2800" dirty="0"/>
+          </a:p>
+          <a:p>
+            <a:r>
+              <a:rPr lang="de-CH" sz="2800" dirty="0">
                 <a:solidFill>
                   <a:srgbClr val="430A69"/>
                 </a:solidFill>
               </a:rPr>
-              <a:t>Questions?</a:t>
-            </a:r>
+              <a:t>A SHAP </a:t>
+            </a:r>
+            <a:r>
+              <a:rPr lang="de-CH" sz="2800" dirty="0" err="1">
+                <a:solidFill>
+                  <a:srgbClr val="430A69"/>
+                </a:solidFill>
+              </a:rPr>
+              <a:t>analysis</a:t>
+            </a:r>
+            <a:r>
+              <a:rPr lang="de-CH" sz="2800" dirty="0">
+                <a:solidFill>
+                  <a:srgbClr val="430A69"/>
+                </a:solidFill>
+              </a:rPr>
+              <a:t> </a:t>
+            </a:r>
+            <a:r>
+              <a:rPr lang="de-CH" sz="2800" dirty="0" err="1">
+                <a:solidFill>
+                  <a:srgbClr val="430A69"/>
+                </a:solidFill>
+              </a:rPr>
+              <a:t>is</a:t>
+            </a:r>
+            <a:r>
+              <a:rPr lang="de-CH" sz="2800" dirty="0">
+                <a:solidFill>
+                  <a:srgbClr val="430A69"/>
+                </a:solidFill>
+              </a:rPr>
+              <a:t> </a:t>
+            </a:r>
+            <a:r>
+              <a:rPr lang="de-CH" sz="2800" dirty="0" err="1">
+                <a:solidFill>
+                  <a:srgbClr val="430A69"/>
+                </a:solidFill>
+              </a:rPr>
+              <a:t>as</a:t>
+            </a:r>
+            <a:r>
+              <a:rPr lang="de-CH" sz="2800" dirty="0">
+                <a:solidFill>
+                  <a:srgbClr val="430A69"/>
+                </a:solidFill>
+              </a:rPr>
+              <a:t> </a:t>
+            </a:r>
+            <a:r>
+              <a:rPr lang="de-CH" sz="2800" dirty="0" err="1">
+                <a:solidFill>
+                  <a:srgbClr val="430A69"/>
+                </a:solidFill>
+              </a:rPr>
+              <a:t>good</a:t>
+            </a:r>
+            <a:r>
+              <a:rPr lang="de-CH" sz="2800" dirty="0">
+                <a:solidFill>
+                  <a:srgbClr val="430A69"/>
+                </a:solidFill>
+              </a:rPr>
+              <a:t> </a:t>
+            </a:r>
+            <a:r>
+              <a:rPr lang="de-CH" sz="2800" dirty="0" err="1">
+                <a:solidFill>
+                  <a:srgbClr val="430A69"/>
+                </a:solidFill>
+              </a:rPr>
+              <a:t>or</a:t>
+            </a:r>
+            <a:r>
+              <a:rPr lang="de-CH" sz="2800" dirty="0">
+                <a:solidFill>
+                  <a:srgbClr val="430A69"/>
+                </a:solidFill>
+              </a:rPr>
+              <a:t> </a:t>
+            </a:r>
+            <a:r>
+              <a:rPr lang="de-CH" sz="2800" dirty="0" err="1">
+                <a:solidFill>
+                  <a:srgbClr val="430A69"/>
+                </a:solidFill>
+              </a:rPr>
+              <a:t>bad</a:t>
+            </a:r>
+            <a:r>
+              <a:rPr lang="de-CH" sz="2800" dirty="0">
+                <a:solidFill>
+                  <a:srgbClr val="430A69"/>
+                </a:solidFill>
+              </a:rPr>
+              <a:t> </a:t>
+            </a:r>
+            <a:r>
+              <a:rPr lang="de-CH" sz="2800" dirty="0" err="1">
+                <a:solidFill>
+                  <a:srgbClr val="430A69"/>
+                </a:solidFill>
+              </a:rPr>
+              <a:t>as</a:t>
+            </a:r>
+            <a:r>
+              <a:rPr lang="de-CH" sz="2800" dirty="0">
+                <a:solidFill>
+                  <a:srgbClr val="430A69"/>
+                </a:solidFill>
+              </a:rPr>
+              <a:t> </a:t>
+            </a:r>
+            <a:r>
+              <a:rPr lang="de-CH" sz="2800" dirty="0" err="1">
+                <a:solidFill>
+                  <a:srgbClr val="430A69"/>
+                </a:solidFill>
+              </a:rPr>
+              <a:t>your</a:t>
+            </a:r>
+            <a:r>
+              <a:rPr lang="de-CH" sz="2800" dirty="0">
+                <a:solidFill>
+                  <a:srgbClr val="430A69"/>
+                </a:solidFill>
+              </a:rPr>
+              <a:t> </a:t>
+            </a:r>
+            <a:r>
+              <a:rPr lang="de-CH" sz="2800" dirty="0" err="1">
+                <a:solidFill>
+                  <a:srgbClr val="430A69"/>
+                </a:solidFill>
+              </a:rPr>
+              <a:t>model</a:t>
+            </a:r>
+            <a:r>
+              <a:rPr lang="de-CH" sz="2800" dirty="0">
+                <a:solidFill>
+                  <a:srgbClr val="430A69"/>
+                </a:solidFill>
+              </a:rPr>
+              <a:t>!</a:t>
+            </a:r>
+          </a:p>
+          <a:p>
+            <a:pPr marL="285750" indent="-285750">
+              <a:buFont typeface="Arial" panose="020B0604020202020204" pitchFamily="34" charset="0"/>
+              <a:buChar char="•"/>
+            </a:pPr>
+            <a:endParaRPr lang="de-CH" dirty="0"/>
           </a:p>
         </p:txBody>
       </p:sp>
     </p:spTree>
     <p:extLst>
       <p:ext uri="{BB962C8B-B14F-4D97-AF65-F5344CB8AC3E}">
-        <p14:creationId xmlns:p14="http://schemas.microsoft.com/office/powerpoint/2010/main" val="309312604"/>
+        <p14:creationId xmlns:p14="http://schemas.microsoft.com/office/powerpoint/2010/main" val="135354231"/>
       </p:ext>
     </p:extLst>
   </p:cSld>
@@ -6940,265 +7760,25 @@
             <p:ph type="title"/>
           </p:nvPr>
         </p:nvSpPr>
-        <p:spPr/>
-        <p:txBody>
-          <a:bodyPr/>
-          <a:lstStyle/>
-          <a:p>
-            <a:r>
-              <a:rPr lang="de-CH" dirty="0">
-                <a:solidFill>
-                  <a:srgbClr val="430A69"/>
-                </a:solidFill>
-              </a:rPr>
-              <a:t>Resources</a:t>
-            </a:r>
-          </a:p>
-        </p:txBody>
-      </p:sp>
-      <p:sp>
-        <p:nvSpPr>
-          <p:cNvPr id="3" name="Textfeld 2">
-            <a:extLst>
-              <a:ext uri="{FF2B5EF4-FFF2-40B4-BE49-F238E27FC236}">
-                <a16:creationId xmlns:a16="http://schemas.microsoft.com/office/drawing/2014/main" id="{CFE42540-A8BA-21E8-5434-DCB0EAD57257}"/>
-              </a:ext>
-            </a:extLst>
-          </p:cNvPr>
-          <p:cNvSpPr txBox="1"/>
-          <p:nvPr/>
-        </p:nvSpPr>
         <p:spPr>
           <a:xfrm>
-            <a:off x="1126156" y="2107933"/>
-            <a:ext cx="10227644" cy="3877985"/>
+            <a:off x="3080887" y="2442093"/>
+            <a:ext cx="6236368" cy="1973814"/>
           </a:xfrm>
-          <a:prstGeom prst="rect">
-            <a:avLst/>
-          </a:prstGeom>
-          <a:noFill/>
         </p:spPr>
         <p:txBody>
-          <a:bodyPr wrap="square" rtlCol="0">
-            <a:spAutoFit/>
+          <a:bodyPr>
+            <a:noAutofit/>
           </a:bodyPr>
           <a:lstStyle/>
           <a:p>
-            <a:pPr marL="285750" indent="-285750">
-              <a:buFont typeface="Arial" panose="020B0604020202020204" pitchFamily="34" charset="0"/>
-              <a:buChar char="•"/>
-            </a:pPr>
-            <a:r>
-              <a:rPr lang="de-CH" sz="2400" dirty="0"/>
-              <a:t>Slides and </a:t>
-            </a:r>
-            <a:r>
-              <a:rPr lang="de-CH" sz="2400" dirty="0" err="1"/>
-              <a:t>demo</a:t>
-            </a:r>
-            <a:r>
-              <a:rPr lang="de-CH" sz="2400" dirty="0"/>
-              <a:t>: </a:t>
-            </a:r>
-            <a:r>
-              <a:rPr lang="de-CH" sz="2400" dirty="0">
-                <a:hlinkClick r:id="rId3"/>
-              </a:rPr>
-              <a:t>https://github.com/mayer79/demo_shapviz</a:t>
-            </a:r>
-            <a:br>
-              <a:rPr lang="de-CH" sz="2400" dirty="0"/>
-            </a:br>
-            <a:endParaRPr lang="de-CH" sz="2400" dirty="0"/>
-          </a:p>
-          <a:p>
-            <a:pPr marL="285750" indent="-285750">
-              <a:buFont typeface="Arial" panose="020B0604020202020204" pitchFamily="34" charset="0"/>
-              <a:buChar char="•"/>
-            </a:pPr>
-            <a:r>
-              <a:rPr lang="de-CH" dirty="0"/>
-              <a:t>{</a:t>
-            </a:r>
-            <a:r>
-              <a:rPr lang="de-CH" dirty="0" err="1"/>
-              <a:t>shapviz</a:t>
-            </a:r>
-            <a:r>
-              <a:rPr lang="de-CH" dirty="0"/>
-              <a:t>}: </a:t>
-            </a:r>
-            <a:r>
-              <a:rPr lang="de-CH" dirty="0">
-                <a:hlinkClick r:id="rId4"/>
-              </a:rPr>
-              <a:t>https://github.com/ModelOriented/shapviz</a:t>
-            </a:r>
-            <a:endParaRPr lang="de-CH" dirty="0"/>
-          </a:p>
-          <a:p>
-            <a:pPr marL="285750" indent="-285750">
-              <a:buFont typeface="Arial" panose="020B0604020202020204" pitchFamily="34" charset="0"/>
-              <a:buChar char="•"/>
-            </a:pPr>
-            <a:r>
-              <a:rPr lang="de-CH" dirty="0"/>
-              <a:t>{kernelshap}: </a:t>
-            </a:r>
-            <a:r>
-              <a:rPr lang="de-CH" dirty="0">
-                <a:hlinkClick r:id="rId5"/>
-              </a:rPr>
-              <a:t>https://github.com/ModelOriented/kernelshap</a:t>
-            </a:r>
-            <a:endParaRPr lang="de-CH" dirty="0"/>
-          </a:p>
-          <a:p>
-            <a:pPr marL="285750" indent="-285750">
-              <a:buFont typeface="Arial" panose="020B0604020202020204" pitchFamily="34" charset="0"/>
-              <a:buChar char="•"/>
-            </a:pPr>
-            <a:r>
-              <a:rPr lang="de-CH" dirty="0"/>
-              <a:t>Python: </a:t>
-            </a:r>
-            <a:r>
-              <a:rPr lang="de-CH" dirty="0">
-                <a:hlinkClick r:id="rId6"/>
-              </a:rPr>
-              <a:t>https://github.com/shap/shap</a:t>
-            </a:r>
-            <a:endParaRPr lang="de-CH" dirty="0"/>
-          </a:p>
-          <a:p>
-            <a:pPr marL="285750" indent="-285750">
-              <a:buFont typeface="Arial" panose="020B0604020202020204" pitchFamily="34" charset="0"/>
-              <a:buChar char="•"/>
-            </a:pPr>
-            <a:r>
-              <a:rPr lang="de-CH" dirty="0"/>
-              <a:t>Theory and code in R and Python: </a:t>
-            </a:r>
-            <a:br>
-              <a:rPr lang="en-US" b="0" i="0" dirty="0">
-                <a:solidFill>
-                  <a:srgbClr val="505050"/>
-                </a:solidFill>
-                <a:effectLst/>
-                <a:latin typeface="NexusSansWebPro"/>
-              </a:rPr>
-            </a:br>
-            <a:r>
-              <a:rPr lang="en-US" b="0" i="0" dirty="0">
-                <a:solidFill>
-                  <a:srgbClr val="505050"/>
-                </a:solidFill>
-                <a:effectLst/>
-                <a:latin typeface="NexusSansWebPro"/>
-              </a:rPr>
-              <a:t>SHAP for Actuaries: Explain any Model (2023)</a:t>
-            </a:r>
-            <a:br>
-              <a:rPr lang="en-US" b="0" i="0" dirty="0">
-                <a:solidFill>
-                  <a:srgbClr val="505050"/>
-                </a:solidFill>
-                <a:effectLst/>
-                <a:latin typeface="NexusSansWebPro"/>
-              </a:rPr>
-            </a:br>
-            <a:r>
-              <a:rPr lang="en-US" b="0" i="0" dirty="0">
-                <a:solidFill>
-                  <a:srgbClr val="505050"/>
-                </a:solidFill>
-                <a:effectLst/>
-                <a:latin typeface="NexusSansWebPro"/>
-              </a:rPr>
-              <a:t>Michael Mayer, Daniel Meier, and Mario V. Wüthrich</a:t>
-            </a:r>
-            <a:br>
-              <a:rPr lang="en-US" b="0" i="0" dirty="0">
-                <a:solidFill>
-                  <a:srgbClr val="505050"/>
-                </a:solidFill>
-                <a:effectLst/>
-                <a:latin typeface="NexusSansWebPro"/>
-              </a:rPr>
-            </a:br>
-            <a:r>
-              <a:rPr lang="en-US" b="0" i="0" u="sng" dirty="0">
-                <a:solidFill>
-                  <a:srgbClr val="505050"/>
-                </a:solidFill>
-                <a:effectLst/>
-                <a:latin typeface="NexusSansWebPro"/>
-                <a:hlinkClick r:id="rId7"/>
-              </a:rPr>
-              <a:t>http://dx.doi.org/10.2139/ssrn.4389797</a:t>
-            </a:r>
-            <a:endParaRPr lang="en-US" b="0" i="0" u="sng" dirty="0">
-              <a:solidFill>
-                <a:srgbClr val="505050"/>
-              </a:solidFill>
-              <a:effectLst/>
-              <a:latin typeface="NexusSansWebPro"/>
-            </a:endParaRPr>
-          </a:p>
-          <a:p>
-            <a:pPr marL="285750" indent="-285750">
-              <a:buFont typeface="Arial" panose="020B0604020202020204" pitchFamily="34" charset="0"/>
-              <a:buChar char="•"/>
-            </a:pPr>
-            <a:r>
-              <a:rPr lang="en-US" dirty="0"/>
-              <a:t>Original SHAP paper:</a:t>
-            </a:r>
-            <a:br>
-              <a:rPr lang="en-US" dirty="0"/>
-            </a:br>
-            <a:r>
-              <a:rPr lang="en-US" dirty="0">
-                <a:solidFill>
-                  <a:srgbClr val="505050"/>
-                </a:solidFill>
-                <a:latin typeface="NexusSansWebPro"/>
-              </a:rPr>
-              <a:t>A unified approach to interpreting model predictions (2017)</a:t>
-            </a:r>
-            <a:br>
-              <a:rPr lang="de-CH" dirty="0">
-                <a:solidFill>
-                  <a:srgbClr val="505050"/>
-                </a:solidFill>
-                <a:latin typeface="NexusSansWebPro"/>
-              </a:rPr>
-            </a:br>
-            <a:r>
-              <a:rPr lang="de-CH" dirty="0">
-                <a:solidFill>
-                  <a:srgbClr val="505050"/>
-                </a:solidFill>
-                <a:latin typeface="NexusSansWebPro"/>
-              </a:rPr>
-              <a:t>Scott Lundberg and Su-In Lee</a:t>
-            </a:r>
-            <a:br>
-              <a:rPr lang="de-CH" dirty="0">
-                <a:solidFill>
-                  <a:srgbClr val="505050"/>
-                </a:solidFill>
-                <a:latin typeface="NexusSansWebPro"/>
-              </a:rPr>
-            </a:br>
-            <a:r>
-              <a:rPr lang="en-US" dirty="0">
-                <a:solidFill>
-                  <a:srgbClr val="505050"/>
-                </a:solidFill>
-                <a:latin typeface="NexusSansWebPro"/>
-              </a:rPr>
-              <a:t>NIPS'17: Proceedings of the 31st International Conference on Neural Information Processing Systems</a:t>
+            <a:r>
+              <a:rPr lang="de-CH" sz="9600" dirty="0">
+                <a:solidFill>
+                  <a:srgbClr val="430A69"/>
+                </a:solidFill>
+              </a:rPr>
+              <a:t>Questions?</a:t>
             </a:r>
           </a:p>
         </p:txBody>
@@ -7206,7 +7786,7 @@
     </p:spTree>
     <p:extLst>
       <p:ext uri="{BB962C8B-B14F-4D97-AF65-F5344CB8AC3E}">
-        <p14:creationId xmlns:p14="http://schemas.microsoft.com/office/powerpoint/2010/main" val="4156408452"/>
+        <p14:creationId xmlns:p14="http://schemas.microsoft.com/office/powerpoint/2010/main" val="309312604"/>
       </p:ext>
     </p:extLst>
   </p:cSld>

</xml_diff>